<commit_message>
- open .mo file and auto-reload proposition - reload in omc function updated
git-svn-id: https://openmodelica.org/svn/OpenModelica/trunk@10945 f25d12d1-65f4-0310-ae8a-bbce733d8d8e
</commit_message>
<xml_diff>
--- a/OMOptim/Doc/HowProblemWorks.pptx
+++ b/OMOptim/Doc/HowProblemWorks.pptx
@@ -7,29 +7,30 @@
   <p:sldIdLst>
     <p:sldId id="278" r:id="rId2"/>
     <p:sldId id="279" r:id="rId3"/>
-    <p:sldId id="277" r:id="rId4"/>
-    <p:sldId id="258" r:id="rId5"/>
-    <p:sldId id="263" r:id="rId6"/>
-    <p:sldId id="270" r:id="rId7"/>
-    <p:sldId id="271" r:id="rId8"/>
-    <p:sldId id="274" r:id="rId9"/>
-    <p:sldId id="266" r:id="rId10"/>
-    <p:sldId id="260" r:id="rId11"/>
-    <p:sldId id="265" r:id="rId12"/>
-    <p:sldId id="264" r:id="rId13"/>
-    <p:sldId id="269" r:id="rId14"/>
-    <p:sldId id="272" r:id="rId15"/>
-    <p:sldId id="259" r:id="rId16"/>
-    <p:sldId id="261" r:id="rId17"/>
-    <p:sldId id="256" r:id="rId18"/>
-    <p:sldId id="257" r:id="rId19"/>
-    <p:sldId id="268" r:id="rId20"/>
-    <p:sldId id="275" r:id="rId21"/>
-    <p:sldId id="276" r:id="rId22"/>
-    <p:sldId id="280" r:id="rId23"/>
-    <p:sldId id="273" r:id="rId24"/>
-    <p:sldId id="267" r:id="rId25"/>
-    <p:sldId id="262" r:id="rId26"/>
+    <p:sldId id="281" r:id="rId4"/>
+    <p:sldId id="277" r:id="rId5"/>
+    <p:sldId id="258" r:id="rId6"/>
+    <p:sldId id="263" r:id="rId7"/>
+    <p:sldId id="270" r:id="rId8"/>
+    <p:sldId id="271" r:id="rId9"/>
+    <p:sldId id="274" r:id="rId10"/>
+    <p:sldId id="266" r:id="rId11"/>
+    <p:sldId id="260" r:id="rId12"/>
+    <p:sldId id="265" r:id="rId13"/>
+    <p:sldId id="264" r:id="rId14"/>
+    <p:sldId id="269" r:id="rId15"/>
+    <p:sldId id="272" r:id="rId16"/>
+    <p:sldId id="259" r:id="rId17"/>
+    <p:sldId id="261" r:id="rId18"/>
+    <p:sldId id="256" r:id="rId19"/>
+    <p:sldId id="257" r:id="rId20"/>
+    <p:sldId id="268" r:id="rId21"/>
+    <p:sldId id="275" r:id="rId22"/>
+    <p:sldId id="276" r:id="rId23"/>
+    <p:sldId id="280" r:id="rId24"/>
+    <p:sldId id="273" r:id="rId25"/>
+    <p:sldId id="267" r:id="rId26"/>
+    <p:sldId id="262" r:id="rId27"/>
   </p:sldIdLst>
   <p:sldSz cx="9144000" cy="6858000" type="screen4x3"/>
   <p:notesSz cx="6858000" cy="9144000"/>
@@ -8787,10 +8788,24 @@
     <dgm:pt modelId="{BFFDFC34-7932-467F-A5CC-03A0905071A9}" type="parTrans" cxnId="{36EC5087-60EF-4C02-A9F6-A953FD5463E1}">
       <dgm:prSet/>
       <dgm:spPr/>
+      <dgm:t>
+        <a:bodyPr/>
+        <a:lstStyle/>
+        <a:p>
+          <a:endParaRPr lang="fr-FR"/>
+        </a:p>
+      </dgm:t>
     </dgm:pt>
     <dgm:pt modelId="{9A790E47-869B-4803-80BD-7EC3316B6B6B}" type="sibTrans" cxnId="{36EC5087-60EF-4C02-A9F6-A953FD5463E1}">
       <dgm:prSet/>
       <dgm:spPr/>
+      <dgm:t>
+        <a:bodyPr/>
+        <a:lstStyle/>
+        <a:p>
+          <a:endParaRPr lang="fr-FR"/>
+        </a:p>
+      </dgm:t>
     </dgm:pt>
     <dgm:pt modelId="{6EADFD6B-F6E5-4BF4-842E-D35E0A9DD23B}">
       <dgm:prSet phldrT="[Texte]"/>
@@ -8814,10 +8829,24 @@
     <dgm:pt modelId="{A099F581-53AC-4517-B42B-A418741D63CC}" type="parTrans" cxnId="{DEEF7685-62D0-4461-BD39-08C14155C9BF}">
       <dgm:prSet/>
       <dgm:spPr/>
+      <dgm:t>
+        <a:bodyPr/>
+        <a:lstStyle/>
+        <a:p>
+          <a:endParaRPr lang="fr-FR"/>
+        </a:p>
+      </dgm:t>
     </dgm:pt>
     <dgm:pt modelId="{7A640B51-674D-40B5-A6DA-BA472B0FFD5C}" type="sibTrans" cxnId="{DEEF7685-62D0-4461-BD39-08C14155C9BF}">
       <dgm:prSet/>
       <dgm:spPr/>
+      <dgm:t>
+        <a:bodyPr/>
+        <a:lstStyle/>
+        <a:p>
+          <a:endParaRPr lang="fr-FR"/>
+        </a:p>
+      </dgm:t>
     </dgm:pt>
     <dgm:pt modelId="{CCE277D6-ED0A-4755-A6E4-4316C103CFF0}">
       <dgm:prSet phldrT="[Texte]"/>
@@ -8837,10 +8866,24 @@
     <dgm:pt modelId="{7EEA2B94-DF8A-4CC8-83EB-99A9D6D32B1A}" type="parTrans" cxnId="{FE47E34E-B210-4707-A278-D6B268F3A88F}">
       <dgm:prSet/>
       <dgm:spPr/>
+      <dgm:t>
+        <a:bodyPr/>
+        <a:lstStyle/>
+        <a:p>
+          <a:endParaRPr lang="fr-FR"/>
+        </a:p>
+      </dgm:t>
     </dgm:pt>
     <dgm:pt modelId="{500FB38B-A388-4DE6-ACE5-124921D52BB5}" type="sibTrans" cxnId="{FE47E34E-B210-4707-A278-D6B268F3A88F}">
       <dgm:prSet/>
       <dgm:spPr/>
+      <dgm:t>
+        <a:bodyPr/>
+        <a:lstStyle/>
+        <a:p>
+          <a:endParaRPr lang="fr-FR"/>
+        </a:p>
+      </dgm:t>
     </dgm:pt>
     <dgm:pt modelId="{BFF08F80-209A-4488-9CBB-F39D4D3AD10D}" type="pres">
       <dgm:prSet presAssocID="{5F44AF28-2EA2-4CDA-8D13-1042B361AC47}" presName="composite" presStyleCnt="0">
@@ -8873,8 +8916,22 @@
       <dgm:spPr/>
     </dgm:pt>
     <dgm:pt modelId="{831FADA3-95D3-4EDD-8D62-E039C464C787}" type="pres">
-      <dgm:prSet presAssocID="{5F44AF28-2EA2-4CDA-8D13-1042B361AC47}" presName="visible" presStyleLbl="node1" presStyleIdx="0" presStyleCnt="4"/>
-      <dgm:spPr/>
+      <dgm:prSet presAssocID="{5F44AF28-2EA2-4CDA-8D13-1042B361AC47}" presName="visible" presStyleLbl="node1" presStyleIdx="0" presStyleCnt="4" custScaleX="26695" custScaleY="26695"/>
+      <dgm:spPr>
+        <a:blipFill rotWithShape="0">
+          <a:blip xmlns:r="http://schemas.openxmlformats.org/officeDocument/2006/relationships" r:embed="rId1"/>
+          <a:stretch>
+            <a:fillRect/>
+          </a:stretch>
+        </a:blipFill>
+      </dgm:spPr>
+      <dgm:t>
+        <a:bodyPr/>
+        <a:lstStyle/>
+        <a:p>
+          <a:endParaRPr lang="fr-FR"/>
+        </a:p>
+      </dgm:t>
     </dgm:pt>
     <dgm:pt modelId="{FFEF7A81-726F-4B46-9737-4E5B219816D6}" type="pres">
       <dgm:prSet presAssocID="{0FB10104-4A05-4354-B48E-76DD73D6852E}" presName="Name25" presStyleLbl="parChTrans1D1" presStyleIdx="0" presStyleCnt="3"/>
@@ -9028,8 +9085,8 @@
     <dgm:cxn modelId="{48D22040-CF27-448C-BDBA-2A058B043E2D}" srcId="{0B3F7744-8F29-4622-8D49-8C60D1C05890}" destId="{828F7B55-32CA-4297-A0E4-F02A8C986122}" srcOrd="0" destOrd="0" parTransId="{2EA57F0D-7D94-4528-9C74-4BFB9F107881}" sibTransId="{FCAED9A0-5174-4962-9C55-05A3D4A15FE4}"/>
     <dgm:cxn modelId="{7D973084-D08D-48F7-B0D0-4BFA30C2A0F7}" srcId="{5F44AF28-2EA2-4CDA-8D13-1042B361AC47}" destId="{07FB65A4-5703-49B3-9CCB-6E9DC14F3325}" srcOrd="1" destOrd="0" parTransId="{C75B37C3-59DA-43DC-9086-69F6D896F3F4}" sibTransId="{989E8FBE-86B8-47D3-AE39-A15C4F4D0121}"/>
     <dgm:cxn modelId="{36EC5087-60EF-4C02-A9F6-A953FD5463E1}" srcId="{F17851F1-EB37-45C1-81F0-D886824D6417}" destId="{644E039F-0CE2-4F84-900E-A930E0A79599}" srcOrd="2" destOrd="0" parTransId="{BFFDFC34-7932-467F-A5CC-03A0905071A9}" sibTransId="{9A790E47-869B-4803-80BD-7EC3316B6B6B}"/>
+    <dgm:cxn modelId="{4A66E1DF-9D22-412E-A18A-D7D634CA8DC0}" type="presOf" srcId="{6DAF789B-265A-4641-927F-0B09B8CF8206}" destId="{0D5D4495-4913-4557-B891-5019864EB310}" srcOrd="0" destOrd="1" presId="urn:microsoft.com/office/officeart/2005/8/layout/radial2"/>
     <dgm:cxn modelId="{FA80D8BA-E3FB-4C08-85B1-72BA8FCDD4C9}" type="presOf" srcId="{5F44AF28-2EA2-4CDA-8D13-1042B361AC47}" destId="{BFF08F80-209A-4488-9CBB-F39D4D3AD10D}" srcOrd="0" destOrd="0" presId="urn:microsoft.com/office/officeart/2005/8/layout/radial2"/>
-    <dgm:cxn modelId="{4A66E1DF-9D22-412E-A18A-D7D634CA8DC0}" type="presOf" srcId="{6DAF789B-265A-4641-927F-0B09B8CF8206}" destId="{0D5D4495-4913-4557-B891-5019864EB310}" srcOrd="0" destOrd="1" presId="urn:microsoft.com/office/officeart/2005/8/layout/radial2"/>
     <dgm:cxn modelId="{C2F1770C-080F-455E-8143-465304B9E8CB}" type="presOf" srcId="{C75B37C3-59DA-43DC-9086-69F6D896F3F4}" destId="{1CAC1A4C-A982-41F2-84B5-BD79D61052FC}" srcOrd="0" destOrd="0" presId="urn:microsoft.com/office/officeart/2005/8/layout/radial2"/>
     <dgm:cxn modelId="{019518D7-A248-4B3D-B8DF-411510EE31A9}" type="presOf" srcId="{6EADFD6B-F6E5-4BF4-842E-D35E0A9DD23B}" destId="{FAD82DA5-3E64-4280-B56A-2017715C5ACB}" srcOrd="0" destOrd="3" presId="urn:microsoft.com/office/officeart/2005/8/layout/radial2"/>
     <dgm:cxn modelId="{2D03E44A-49DB-4706-8AEC-7527455FC14A}" srcId="{07FB65A4-5703-49B3-9CCB-6E9DC14F3325}" destId="{58685008-E223-4AD0-8B71-A71211216574}" srcOrd="0" destOrd="0" parTransId="{917BE320-7403-43A0-B2D2-53D970E07D5B}" sibTransId="{57729E23-573D-4E8E-B3E5-1786BC6D29D3}"/>
@@ -9544,6 +9601,13 @@
         </dgm:presLayoutVars>
       </dgm:prSet>
       <dgm:spPr/>
+      <dgm:t>
+        <a:bodyPr/>
+        <a:lstStyle/>
+        <a:p>
+          <a:endParaRPr lang="fr-FR"/>
+        </a:p>
+      </dgm:t>
     </dgm:pt>
     <dgm:pt modelId="{E2EC06B3-E29A-4AE8-A1F5-48A4E5C9FBFC}" type="pres">
       <dgm:prSet presAssocID="{DD5E483C-FCF6-4A0D-91A9-2A88F51EABD9}" presName="compNode" presStyleCnt="0"/>
@@ -9552,10 +9616,24 @@
     <dgm:pt modelId="{460E9640-3640-4176-8F97-561AE3B60665}" type="pres">
       <dgm:prSet presAssocID="{DD5E483C-FCF6-4A0D-91A9-2A88F51EABD9}" presName="aNode" presStyleLbl="bgShp" presStyleIdx="0" presStyleCnt="1"/>
       <dgm:spPr/>
+      <dgm:t>
+        <a:bodyPr/>
+        <a:lstStyle/>
+        <a:p>
+          <a:endParaRPr lang="fr-FR"/>
+        </a:p>
+      </dgm:t>
     </dgm:pt>
     <dgm:pt modelId="{655BD28E-914B-40F6-831E-3FDE0CAF804D}" type="pres">
       <dgm:prSet presAssocID="{DD5E483C-FCF6-4A0D-91A9-2A88F51EABD9}" presName="textNode" presStyleLbl="bgShp" presStyleIdx="0" presStyleCnt="1"/>
       <dgm:spPr/>
+      <dgm:t>
+        <a:bodyPr/>
+        <a:lstStyle/>
+        <a:p>
+          <a:endParaRPr lang="fr-FR"/>
+        </a:p>
+      </dgm:t>
     </dgm:pt>
     <dgm:pt modelId="{F693B8C9-F251-4ACA-B04F-929DDE8C1067}" type="pres">
       <dgm:prSet presAssocID="{DD5E483C-FCF6-4A0D-91A9-2A88F51EABD9}" presName="compChildNode" presStyleCnt="0"/>
@@ -9572,6 +9650,13 @@
         </dgm:presLayoutVars>
       </dgm:prSet>
       <dgm:spPr/>
+      <dgm:t>
+        <a:bodyPr/>
+        <a:lstStyle/>
+        <a:p>
+          <a:endParaRPr lang="fr-FR"/>
+        </a:p>
+      </dgm:t>
     </dgm:pt>
     <dgm:pt modelId="{6CC79F6F-B3B9-4BD0-ADEF-7C90F156DEAE}" type="pres">
       <dgm:prSet presAssocID="{116066CA-4628-4606-9201-42471CA6C37D}" presName="aSpace2" presStyleCnt="0"/>
@@ -9584,6 +9669,13 @@
         </dgm:presLayoutVars>
       </dgm:prSet>
       <dgm:spPr/>
+      <dgm:t>
+        <a:bodyPr/>
+        <a:lstStyle/>
+        <a:p>
+          <a:endParaRPr lang="fr-FR"/>
+        </a:p>
+      </dgm:t>
     </dgm:pt>
     <dgm:pt modelId="{3D5A6DBD-32CE-4D98-A3F3-1959A188F114}" type="pres">
       <dgm:prSet presAssocID="{8F858D99-DEA6-4B7B-90ED-9879BD7D73D9}" presName="aSpace2" presStyleCnt="0"/>
@@ -9596,19 +9688,26 @@
         </dgm:presLayoutVars>
       </dgm:prSet>
       <dgm:spPr/>
+      <dgm:t>
+        <a:bodyPr/>
+        <a:lstStyle/>
+        <a:p>
+          <a:endParaRPr lang="fr-FR"/>
+        </a:p>
+      </dgm:t>
     </dgm:pt>
   </dgm:ptLst>
   <dgm:cxnLst>
     <dgm:cxn modelId="{56F64B2F-0AFA-482A-A17D-0083DCBB30C2}" srcId="{DD5E483C-FCF6-4A0D-91A9-2A88F51EABD9}" destId="{116066CA-4628-4606-9201-42471CA6C37D}" srcOrd="0" destOrd="0" parTransId="{812C4CD6-EA32-45A3-86EC-5664BEC8A6F1}" sibTransId="{395FA440-D516-4D6D-8A32-F8C5CA008BAE}"/>
+    <dgm:cxn modelId="{96A18D2B-9A33-4199-8A69-B7BDB680B6D5}" type="presOf" srcId="{BB0E69BC-A4D3-40BA-B837-7DDB8D6439D6}" destId="{7C78537B-53EB-4A93-A1F3-E0953DE7FA71}" srcOrd="0" destOrd="0" presId="urn:microsoft.com/office/officeart/2005/8/layout/lProcess2"/>
     <dgm:cxn modelId="{A9B11A4C-4E68-4BCE-BA1C-20A31F515B69}" srcId="{BB0E69BC-A4D3-40BA-B837-7DDB8D6439D6}" destId="{DD5E483C-FCF6-4A0D-91A9-2A88F51EABD9}" srcOrd="0" destOrd="0" parTransId="{48179448-6363-4A82-8664-C7A80FA701D6}" sibTransId="{7556F97C-7BDD-48E7-B4F3-556275969685}"/>
+    <dgm:cxn modelId="{FB62C863-80AD-408D-AB70-1758E1B5507C}" type="presOf" srcId="{DD5E483C-FCF6-4A0D-91A9-2A88F51EABD9}" destId="{655BD28E-914B-40F6-831E-3FDE0CAF804D}" srcOrd="1" destOrd="0" presId="urn:microsoft.com/office/officeart/2005/8/layout/lProcess2"/>
     <dgm:cxn modelId="{A01F74F0-A20A-418D-99CA-BEC299A1DAD8}" srcId="{DD5E483C-FCF6-4A0D-91A9-2A88F51EABD9}" destId="{8F858D99-DEA6-4B7B-90ED-9879BD7D73D9}" srcOrd="1" destOrd="0" parTransId="{E17A5A93-BF9C-40BB-B878-B1BE28C352A7}" sibTransId="{00BAAE76-E71A-4716-A33F-6EB9CC03E165}"/>
-    <dgm:cxn modelId="{96A18D2B-9A33-4199-8A69-B7BDB680B6D5}" type="presOf" srcId="{BB0E69BC-A4D3-40BA-B837-7DDB8D6439D6}" destId="{7C78537B-53EB-4A93-A1F3-E0953DE7FA71}" srcOrd="0" destOrd="0" presId="urn:microsoft.com/office/officeart/2005/8/layout/lProcess2"/>
-    <dgm:cxn modelId="{FB62C863-80AD-408D-AB70-1758E1B5507C}" type="presOf" srcId="{DD5E483C-FCF6-4A0D-91A9-2A88F51EABD9}" destId="{655BD28E-914B-40F6-831E-3FDE0CAF804D}" srcOrd="1" destOrd="0" presId="urn:microsoft.com/office/officeart/2005/8/layout/lProcess2"/>
+    <dgm:cxn modelId="{82FC077C-83E9-4BA8-B7A2-FCFB1FEBFBE4}" type="presOf" srcId="{DD5E483C-FCF6-4A0D-91A9-2A88F51EABD9}" destId="{460E9640-3640-4176-8F97-561AE3B60665}" srcOrd="0" destOrd="0" presId="urn:microsoft.com/office/officeart/2005/8/layout/lProcess2"/>
+    <dgm:cxn modelId="{317F3259-6F5C-4E30-982E-1D96C629577B}" type="presOf" srcId="{8F858D99-DEA6-4B7B-90ED-9879BD7D73D9}" destId="{184508E5-6CAE-439C-A541-1FEE9D79530C}" srcOrd="0" destOrd="0" presId="urn:microsoft.com/office/officeart/2005/8/layout/lProcess2"/>
+    <dgm:cxn modelId="{B2037B6A-3729-4F71-A5E2-488542CE709C}" srcId="{DD5E483C-FCF6-4A0D-91A9-2A88F51EABD9}" destId="{7FED3E73-FFA5-478F-AEB7-ABD1AFD42DC1}" srcOrd="2" destOrd="0" parTransId="{F071B464-23E0-4D3B-8AED-CA7649BE155A}" sibTransId="{701CB8F3-8DEB-4DED-B82A-CBA511E4B98A}"/>
     <dgm:cxn modelId="{26929BB6-975E-48AD-BAAB-17D6EC78E852}" type="presOf" srcId="{7FED3E73-FFA5-478F-AEB7-ABD1AFD42DC1}" destId="{CBB49329-DED4-4C56-B85F-0E97B3AA295B}" srcOrd="0" destOrd="0" presId="urn:microsoft.com/office/officeart/2005/8/layout/lProcess2"/>
     <dgm:cxn modelId="{3A4F7F65-2F05-4004-A757-221D7D3E0208}" type="presOf" srcId="{116066CA-4628-4606-9201-42471CA6C37D}" destId="{9FF71B36-DB67-4995-95A4-1A1D339A3C36}" srcOrd="0" destOrd="0" presId="urn:microsoft.com/office/officeart/2005/8/layout/lProcess2"/>
-    <dgm:cxn modelId="{317F3259-6F5C-4E30-982E-1D96C629577B}" type="presOf" srcId="{8F858D99-DEA6-4B7B-90ED-9879BD7D73D9}" destId="{184508E5-6CAE-439C-A541-1FEE9D79530C}" srcOrd="0" destOrd="0" presId="urn:microsoft.com/office/officeart/2005/8/layout/lProcess2"/>
-    <dgm:cxn modelId="{B2037B6A-3729-4F71-A5E2-488542CE709C}" srcId="{DD5E483C-FCF6-4A0D-91A9-2A88F51EABD9}" destId="{7FED3E73-FFA5-478F-AEB7-ABD1AFD42DC1}" srcOrd="2" destOrd="0" parTransId="{F071B464-23E0-4D3B-8AED-CA7649BE155A}" sibTransId="{701CB8F3-8DEB-4DED-B82A-CBA511E4B98A}"/>
-    <dgm:cxn modelId="{82FC077C-83E9-4BA8-B7A2-FCFB1FEBFBE4}" type="presOf" srcId="{DD5E483C-FCF6-4A0D-91A9-2A88F51EABD9}" destId="{460E9640-3640-4176-8F97-561AE3B60665}" srcOrd="0" destOrd="0" presId="urn:microsoft.com/office/officeart/2005/8/layout/lProcess2"/>
     <dgm:cxn modelId="{A905374D-C40D-4987-A7CF-91FEDBCCC7C4}" type="presParOf" srcId="{7C78537B-53EB-4A93-A1F3-E0953DE7FA71}" destId="{E2EC06B3-E29A-4AE8-A1F5-48A4E5C9FBFC}" srcOrd="0" destOrd="0" presId="urn:microsoft.com/office/officeart/2005/8/layout/lProcess2"/>
     <dgm:cxn modelId="{E93715DA-A097-4F58-8E47-410E9FEC7240}" type="presParOf" srcId="{E2EC06B3-E29A-4AE8-A1F5-48A4E5C9FBFC}" destId="{460E9640-3640-4176-8F97-561AE3B60665}" srcOrd="0" destOrd="0" presId="urn:microsoft.com/office/officeart/2005/8/layout/lProcess2"/>
     <dgm:cxn modelId="{F24A69D6-D59C-4830-9945-222A4455986E}" type="presParOf" srcId="{E2EC06B3-E29A-4AE8-A1F5-48A4E5C9FBFC}" destId="{655BD28E-914B-40F6-831E-3FDE0CAF804D}" srcOrd="1" destOrd="0" presId="urn:microsoft.com/office/officeart/2005/8/layout/lProcess2"/>
@@ -12870,7 +12969,7 @@
       </dsp:nvSpPr>
       <dsp:spPr>
         <a:xfrm rot="2562158">
-          <a:off x="2871322" y="3173733"/>
+          <a:off x="2708277" y="3173733"/>
           <a:ext cx="685188" cy="47548"/>
         </a:xfrm>
         <a:custGeom>
@@ -12925,7 +13024,7 @@
       </dsp:nvSpPr>
       <dsp:spPr>
         <a:xfrm>
-          <a:off x="2962150" y="2239207"/>
+          <a:off x="2799105" y="2239207"/>
           <a:ext cx="761807" cy="47548"/>
         </a:xfrm>
         <a:custGeom>
@@ -12980,7 +13079,7 @@
       </dsp:nvSpPr>
       <dsp:spPr>
         <a:xfrm rot="19037842">
-          <a:off x="2871322" y="1304680"/>
+          <a:off x="2708277" y="1304680"/>
           <a:ext cx="685188" cy="47548"/>
         </a:xfrm>
         <a:custGeom>
@@ -13035,20 +13134,18 @@
       </dsp:nvSpPr>
       <dsp:spPr>
         <a:xfrm>
-          <a:off x="1114307" y="1176015"/>
-          <a:ext cx="2173932" cy="2173932"/>
+          <a:off x="1748063" y="1972815"/>
+          <a:ext cx="580331" cy="580331"/>
         </a:xfrm>
         <a:prstGeom prst="ellipse">
           <a:avLst/>
         </a:prstGeom>
-        <a:solidFill>
-          <a:schemeClr val="accent1">
-            <a:hueOff val="0"/>
-            <a:satOff val="0"/>
-            <a:lumOff val="0"/>
-            <a:alphaOff val="0"/>
-          </a:schemeClr>
-        </a:solidFill>
+        <a:blipFill rotWithShape="0">
+          <a:blip xmlns:r="http://schemas.openxmlformats.org/officeDocument/2006/relationships" r:embed="rId1"/>
+          <a:stretch>
+            <a:fillRect/>
+          </a:stretch>
+        </a:blipFill>
         <a:ln w="25400" cap="flat" cmpd="sng" algn="ctr">
           <a:solidFill>
             <a:schemeClr val="lt1">
@@ -13084,7 +13181,7 @@
       </dsp:nvSpPr>
       <dsp:spPr>
         <a:xfrm>
-          <a:off x="3292780" y="1626"/>
+          <a:off x="3129735" y="1626"/>
           <a:ext cx="1304359" cy="1304359"/>
         </a:xfrm>
         <a:prstGeom prst="ellipse">
@@ -13150,7 +13247,7 @@
         </a:p>
       </dsp:txBody>
       <dsp:txXfrm>
-        <a:off x="3292780" y="1626"/>
+        <a:off x="3129735" y="1626"/>
         <a:ext cx="1304359" cy="1304359"/>
       </dsp:txXfrm>
     </dsp:sp>
@@ -13161,7 +13258,7 @@
       </dsp:nvSpPr>
       <dsp:spPr>
         <a:xfrm>
-          <a:off x="4727575" y="1626"/>
+          <a:off x="4564530" y="1626"/>
           <a:ext cx="1956539" cy="1304359"/>
         </a:xfrm>
         <a:prstGeom prst="rect">
@@ -13272,7 +13369,7 @@
         </a:p>
       </dsp:txBody>
       <dsp:txXfrm>
-        <a:off x="4727575" y="1626"/>
+        <a:off x="4564530" y="1626"/>
         <a:ext cx="1956539" cy="1304359"/>
       </dsp:txXfrm>
     </dsp:sp>
@@ -13283,7 +13380,7 @@
       </dsp:nvSpPr>
       <dsp:spPr>
         <a:xfrm>
-          <a:off x="3723957" y="1610801"/>
+          <a:off x="3560912" y="1610801"/>
           <a:ext cx="1304359" cy="1304359"/>
         </a:xfrm>
         <a:prstGeom prst="ellipse">
@@ -13349,7 +13446,7 @@
         </a:p>
       </dsp:txBody>
       <dsp:txXfrm>
-        <a:off x="3723957" y="1610801"/>
+        <a:off x="3560912" y="1610801"/>
         <a:ext cx="1304359" cy="1304359"/>
       </dsp:txXfrm>
     </dsp:sp>
@@ -13360,7 +13457,7 @@
       </dsp:nvSpPr>
       <dsp:spPr>
         <a:xfrm>
-          <a:off x="5158753" y="1610801"/>
+          <a:off x="4995708" y="1610801"/>
           <a:ext cx="1956539" cy="1304359"/>
         </a:xfrm>
         <a:prstGeom prst="rect">
@@ -13467,7 +13564,7 @@
         </a:p>
       </dsp:txBody>
       <dsp:txXfrm>
-        <a:off x="5158753" y="1610801"/>
+        <a:off x="4995708" y="1610801"/>
         <a:ext cx="1956539" cy="1304359"/>
       </dsp:txXfrm>
     </dsp:sp>
@@ -13478,7 +13575,7 @@
       </dsp:nvSpPr>
       <dsp:spPr>
         <a:xfrm>
-          <a:off x="3292780" y="3219977"/>
+          <a:off x="3129735" y="3219977"/>
           <a:ext cx="1304359" cy="1304359"/>
         </a:xfrm>
         <a:prstGeom prst="ellipse">
@@ -13544,7 +13641,7 @@
         </a:p>
       </dsp:txBody>
       <dsp:txXfrm>
-        <a:off x="3292780" y="3219977"/>
+        <a:off x="3129735" y="3219977"/>
         <a:ext cx="1304359" cy="1304359"/>
       </dsp:txXfrm>
     </dsp:sp>
@@ -13555,7 +13652,7 @@
       </dsp:nvSpPr>
       <dsp:spPr>
         <a:xfrm>
-          <a:off x="4727575" y="3219977"/>
+          <a:off x="4564530" y="3219977"/>
           <a:ext cx="1956539" cy="1304359"/>
         </a:xfrm>
         <a:prstGeom prst="rect">
@@ -13643,7 +13740,7 @@
         </a:p>
       </dsp:txBody>
       <dsp:txXfrm>
-        <a:off x="4727575" y="3219977"/>
+        <a:off x="4564530" y="3219977"/>
         <a:ext cx="1956539" cy="1304359"/>
       </dsp:txXfrm>
     </dsp:sp>
@@ -31628,7 +31725,7 @@
             <a:fld id="{2F7109DB-22F2-4A44-B01C-5DFB47C7C527}" type="datetimeFigureOut">
               <a:rPr lang="fr-FR" smtClean="0"/>
               <a:pPr/>
-              <a:t>03/01/2012</a:t>
+              <a:t>23/01/2012</a:t>
             </a:fld>
             <a:endParaRPr lang="fr-FR"/>
           </a:p>
@@ -31795,7 +31892,7 @@
             <a:fld id="{2F7109DB-22F2-4A44-B01C-5DFB47C7C527}" type="datetimeFigureOut">
               <a:rPr lang="fr-FR" smtClean="0"/>
               <a:pPr/>
-              <a:t>03/01/2012</a:t>
+              <a:t>23/01/2012</a:t>
             </a:fld>
             <a:endParaRPr lang="fr-FR"/>
           </a:p>
@@ -31972,7 +32069,7 @@
             <a:fld id="{2F7109DB-22F2-4A44-B01C-5DFB47C7C527}" type="datetimeFigureOut">
               <a:rPr lang="fr-FR" smtClean="0"/>
               <a:pPr/>
-              <a:t>03/01/2012</a:t>
+              <a:t>23/01/2012</a:t>
             </a:fld>
             <a:endParaRPr lang="fr-FR"/>
           </a:p>
@@ -32139,7 +32236,7 @@
             <a:fld id="{2F7109DB-22F2-4A44-B01C-5DFB47C7C527}" type="datetimeFigureOut">
               <a:rPr lang="fr-FR" smtClean="0"/>
               <a:pPr/>
-              <a:t>03/01/2012</a:t>
+              <a:t>23/01/2012</a:t>
             </a:fld>
             <a:endParaRPr lang="fr-FR"/>
           </a:p>
@@ -32382,7 +32479,7 @@
             <a:fld id="{2F7109DB-22F2-4A44-B01C-5DFB47C7C527}" type="datetimeFigureOut">
               <a:rPr lang="fr-FR" smtClean="0"/>
               <a:pPr/>
-              <a:t>03/01/2012</a:t>
+              <a:t>23/01/2012</a:t>
             </a:fld>
             <a:endParaRPr lang="fr-FR"/>
           </a:p>
@@ -32667,7 +32764,7 @@
             <a:fld id="{2F7109DB-22F2-4A44-B01C-5DFB47C7C527}" type="datetimeFigureOut">
               <a:rPr lang="fr-FR" smtClean="0"/>
               <a:pPr/>
-              <a:t>03/01/2012</a:t>
+              <a:t>23/01/2012</a:t>
             </a:fld>
             <a:endParaRPr lang="fr-FR"/>
           </a:p>
@@ -33086,7 +33183,7 @@
             <a:fld id="{2F7109DB-22F2-4A44-B01C-5DFB47C7C527}" type="datetimeFigureOut">
               <a:rPr lang="fr-FR" smtClean="0"/>
               <a:pPr/>
-              <a:t>03/01/2012</a:t>
+              <a:t>23/01/2012</a:t>
             </a:fld>
             <a:endParaRPr lang="fr-FR"/>
           </a:p>
@@ -33201,7 +33298,7 @@
             <a:fld id="{2F7109DB-22F2-4A44-B01C-5DFB47C7C527}" type="datetimeFigureOut">
               <a:rPr lang="fr-FR" smtClean="0"/>
               <a:pPr/>
-              <a:t>03/01/2012</a:t>
+              <a:t>23/01/2012</a:t>
             </a:fld>
             <a:endParaRPr lang="fr-FR"/>
           </a:p>
@@ -33293,7 +33390,7 @@
             <a:fld id="{2F7109DB-22F2-4A44-B01C-5DFB47C7C527}" type="datetimeFigureOut">
               <a:rPr lang="fr-FR" smtClean="0"/>
               <a:pPr/>
-              <a:t>03/01/2012</a:t>
+              <a:t>23/01/2012</a:t>
             </a:fld>
             <a:endParaRPr lang="fr-FR"/>
           </a:p>
@@ -33567,7 +33664,7 @@
             <a:fld id="{2F7109DB-22F2-4A44-B01C-5DFB47C7C527}" type="datetimeFigureOut">
               <a:rPr lang="fr-FR" smtClean="0"/>
               <a:pPr/>
-              <a:t>03/01/2012</a:t>
+              <a:t>23/01/2012</a:t>
             </a:fld>
             <a:endParaRPr lang="fr-FR"/>
           </a:p>
@@ -33817,7 +33914,7 @@
             <a:fld id="{2F7109DB-22F2-4A44-B01C-5DFB47C7C527}" type="datetimeFigureOut">
               <a:rPr lang="fr-FR" smtClean="0"/>
               <a:pPr/>
-              <a:t>03/01/2012</a:t>
+              <a:t>23/01/2012</a:t>
             </a:fld>
             <a:endParaRPr lang="fr-FR"/>
           </a:p>
@@ -34027,7 +34124,7 @@
             <a:fld id="{2F7109DB-22F2-4A44-B01C-5DFB47C7C527}" type="datetimeFigureOut">
               <a:rPr lang="fr-FR" smtClean="0"/>
               <a:pPr/>
-              <a:t>03/01/2012</a:t>
+              <a:t>23/01/2012</a:t>
             </a:fld>
             <a:endParaRPr lang="fr-FR"/>
           </a:p>
@@ -34484,6 +34581,122 @@
               <a:rPr lang="fr-FR" dirty="0" err="1" smtClean="0">
                 <a:hlinkClick r:id="rId2" action="ppaction://hlinkfile"/>
               </a:rPr>
+              <a:t>ModClassTree</a:t>
+            </a:r>
+            <a:endParaRPr lang="fr-FR" dirty="0"/>
+          </a:p>
+        </p:txBody>
+      </p:sp>
+      <p:sp>
+        <p:nvSpPr>
+          <p:cNvPr id="4" name="Espace réservé du contenu 3"/>
+          <p:cNvSpPr>
+            <a:spLocks noGrp="1"/>
+          </p:cNvSpPr>
+          <p:nvPr>
+            <p:ph sz="half" idx="1"/>
+          </p:nvPr>
+        </p:nvSpPr>
+        <p:spPr/>
+        <p:txBody>
+          <a:bodyPr/>
+          <a:lstStyle/>
+          <a:p>
+            <a:r>
+              <a:rPr lang="fr-FR" dirty="0" err="1" smtClean="0"/>
+              <a:t>Contains</a:t>
+            </a:r>
+            <a:r>
+              <a:rPr lang="fr-FR" dirty="0" smtClean="0"/>
+              <a:t> </a:t>
+            </a:r>
+            <a:r>
+              <a:rPr lang="fr-FR" dirty="0" err="1" smtClean="0"/>
+              <a:t>modelica</a:t>
+            </a:r>
+            <a:r>
+              <a:rPr lang="fr-FR" dirty="0" smtClean="0"/>
+              <a:t> </a:t>
+            </a:r>
+            <a:r>
+              <a:rPr lang="fr-FR" dirty="0" err="1" smtClean="0"/>
+              <a:t>models</a:t>
+            </a:r>
+            <a:r>
+              <a:rPr lang="fr-FR" dirty="0" smtClean="0"/>
+              <a:t>, packages, classes </a:t>
+            </a:r>
+            <a:r>
+              <a:rPr lang="fr-FR" dirty="0" err="1" smtClean="0"/>
+              <a:t>names</a:t>
+            </a:r>
+            <a:endParaRPr lang="fr-FR" dirty="0" smtClean="0"/>
+          </a:p>
+        </p:txBody>
+      </p:sp>
+      <p:sp>
+        <p:nvSpPr>
+          <p:cNvPr id="5" name="Espace réservé du contenu 4"/>
+          <p:cNvSpPr>
+            <a:spLocks noGrp="1"/>
+          </p:cNvSpPr>
+          <p:nvPr>
+            <p:ph sz="half" idx="2"/>
+          </p:nvPr>
+        </p:nvSpPr>
+        <p:spPr/>
+        <p:txBody>
+          <a:bodyPr/>
+          <a:lstStyle/>
+          <a:p>
+            <a:endParaRPr lang="fr-FR"/>
+          </a:p>
+        </p:txBody>
+      </p:sp>
+    </p:spTree>
+  </p:cSld>
+  <p:clrMapOvr>
+    <a:masterClrMapping/>
+  </p:clrMapOvr>
+</p:sld>
+</file>
+
+<file path=ppt/slides/slide11.xml><?xml version="1.0" encoding="utf-8"?>
+<p:sld xmlns:a="http://schemas.openxmlformats.org/drawingml/2006/main" xmlns:r="http://schemas.openxmlformats.org/officeDocument/2006/relationships" xmlns:p="http://schemas.openxmlformats.org/presentationml/2006/main">
+  <p:cSld>
+    <p:spTree>
+      <p:nvGrpSpPr>
+        <p:cNvPr id="1" name=""/>
+        <p:cNvGrpSpPr/>
+        <p:nvPr/>
+      </p:nvGrpSpPr>
+      <p:grpSpPr>
+        <a:xfrm>
+          <a:off x="0" y="0"/>
+          <a:ext cx="0" cy="0"/>
+          <a:chOff x="0" y="0"/>
+          <a:chExt cx="0" cy="0"/>
+        </a:xfrm>
+      </p:grpSpPr>
+      <p:sp>
+        <p:nvSpPr>
+          <p:cNvPr id="2" name="Titre 1"/>
+          <p:cNvSpPr>
+            <a:spLocks noGrp="1"/>
+          </p:cNvSpPr>
+          <p:nvPr>
+            <p:ph type="title"/>
+          </p:nvPr>
+        </p:nvSpPr>
+        <p:spPr/>
+        <p:txBody>
+          <a:bodyPr/>
+          <a:lstStyle/>
+          <a:p>
+            <a:r>
+              <a:rPr lang="fr-FR" dirty="0" err="1" smtClean="0">
+                <a:hlinkClick r:id="rId2" action="ppaction://hlinkfile"/>
+              </a:rPr>
               <a:t>ModModelPlus</a:t>
             </a:r>
             <a:endParaRPr lang="fr-FR" dirty="0"/>
@@ -34702,229 +34915,6 @@
               <a:rPr lang="fr-FR" dirty="0" smtClean="0"/>
               <a:t>.</a:t>
             </a:r>
-          </a:p>
-        </p:txBody>
-      </p:sp>
-    </p:spTree>
-  </p:cSld>
-  <p:clrMapOvr>
-    <a:masterClrMapping/>
-  </p:clrMapOvr>
-  <p:timing>
-    <p:tnLst>
-      <p:par>
-        <p:cTn id="1" dur="indefinite" restart="never" nodeType="tmRoot"/>
-      </p:par>
-    </p:tnLst>
-  </p:timing>
-</p:sld>
-</file>
-
-<file path=ppt/slides/slide11.xml><?xml version="1.0" encoding="utf-8"?>
-<p:sld xmlns:a="http://schemas.openxmlformats.org/drawingml/2006/main" xmlns:r="http://schemas.openxmlformats.org/officeDocument/2006/relationships" xmlns:p="http://schemas.openxmlformats.org/presentationml/2006/main">
-  <p:cSld>
-    <p:spTree>
-      <p:nvGrpSpPr>
-        <p:cNvPr id="1" name=""/>
-        <p:cNvGrpSpPr/>
-        <p:nvPr/>
-      </p:nvGrpSpPr>
-      <p:grpSpPr>
-        <a:xfrm>
-          <a:off x="0" y="0"/>
-          <a:ext cx="0" cy="0"/>
-          <a:chOff x="0" y="0"/>
-          <a:chExt cx="0" cy="0"/>
-        </a:xfrm>
-      </p:grpSpPr>
-      <p:sp>
-        <p:nvSpPr>
-          <p:cNvPr id="2" name="Titre 1"/>
-          <p:cNvSpPr>
-            <a:spLocks noGrp="1"/>
-          </p:cNvSpPr>
-          <p:nvPr>
-            <p:ph type="title"/>
-          </p:nvPr>
-        </p:nvSpPr>
-        <p:spPr/>
-        <p:txBody>
-          <a:bodyPr/>
-          <a:lstStyle/>
-          <a:p>
-            <a:r>
-              <a:rPr lang="fr-FR" dirty="0" err="1" smtClean="0">
-                <a:hlinkClick r:id="rId2" action="ppaction://hlinkfile"/>
-              </a:rPr>
-              <a:t>ModPlusCtrl</a:t>
-            </a:r>
-            <a:endParaRPr lang="fr-FR" dirty="0"/>
-          </a:p>
-        </p:txBody>
-      </p:sp>
-      <p:sp>
-        <p:nvSpPr>
-          <p:cNvPr id="4" name="Espace réservé du contenu 3"/>
-          <p:cNvSpPr>
-            <a:spLocks noGrp="1"/>
-          </p:cNvSpPr>
-          <p:nvPr>
-            <p:ph idx="1"/>
-          </p:nvPr>
-        </p:nvSpPr>
-        <p:spPr>
-          <a:xfrm>
-            <a:off x="395536" y="1412776"/>
-            <a:ext cx="8291264" cy="4713387"/>
-          </a:xfrm>
-        </p:spPr>
-        <p:txBody>
-          <a:bodyPr>
-            <a:normAutofit fontScale="92500" lnSpcReduction="20000"/>
-          </a:bodyPr>
-          <a:lstStyle/>
-          <a:p>
-            <a:r>
-              <a:rPr lang="fr-FR" dirty="0" smtClean="0"/>
-              <a:t>Simulation software </a:t>
-            </a:r>
-            <a:r>
-              <a:rPr lang="fr-FR" dirty="0" err="1" smtClean="0"/>
-              <a:t>controler</a:t>
-            </a:r>
-            <a:r>
-              <a:rPr lang="fr-FR" dirty="0" smtClean="0"/>
-              <a:t> :</a:t>
-            </a:r>
-          </a:p>
-          <a:p>
-            <a:pPr lvl="1"/>
-            <a:r>
-              <a:rPr lang="fr-FR" dirty="0" err="1" smtClean="0"/>
-              <a:t>Specific</a:t>
-            </a:r>
-            <a:r>
-              <a:rPr lang="fr-FR" dirty="0" smtClean="0"/>
-              <a:t> for </a:t>
-            </a:r>
-            <a:r>
-              <a:rPr lang="fr-FR" dirty="0" err="1" smtClean="0"/>
-              <a:t>each</a:t>
-            </a:r>
-            <a:r>
-              <a:rPr lang="fr-FR" dirty="0" smtClean="0"/>
-              <a:t> simulation software</a:t>
-            </a:r>
-          </a:p>
-          <a:p>
-            <a:pPr lvl="1"/>
-            <a:r>
-              <a:rPr lang="fr-FR" dirty="0" err="1" smtClean="0"/>
-              <a:t>Provide</a:t>
-            </a:r>
-            <a:r>
-              <a:rPr lang="fr-FR" dirty="0" smtClean="0"/>
-              <a:t> interface </a:t>
-            </a:r>
-            <a:r>
-              <a:rPr lang="fr-FR" dirty="0" err="1" smtClean="0"/>
-              <a:t>functions</a:t>
-            </a:r>
-            <a:r>
-              <a:rPr lang="fr-FR" dirty="0" smtClean="0"/>
-              <a:t> :</a:t>
-            </a:r>
-          </a:p>
-          <a:p>
-            <a:pPr lvl="2"/>
-            <a:r>
-              <a:rPr lang="fr-FR" dirty="0" smtClean="0"/>
-              <a:t>Set simulation </a:t>
-            </a:r>
-            <a:r>
-              <a:rPr lang="fr-FR" dirty="0" err="1" smtClean="0"/>
-              <a:t>parameters</a:t>
-            </a:r>
-            <a:endParaRPr lang="fr-FR" dirty="0" smtClean="0"/>
-          </a:p>
-          <a:p>
-            <a:pPr lvl="2"/>
-            <a:r>
-              <a:rPr lang="fr-FR" dirty="0" err="1" smtClean="0"/>
-              <a:t>Writing</a:t>
-            </a:r>
-            <a:r>
-              <a:rPr lang="fr-FR" dirty="0" smtClean="0"/>
-              <a:t> / Reading variables</a:t>
-            </a:r>
-          </a:p>
-          <a:p>
-            <a:pPr lvl="2"/>
-            <a:r>
-              <a:rPr lang="fr-FR" dirty="0" err="1" smtClean="0"/>
-              <a:t>Compiling</a:t>
-            </a:r>
-            <a:r>
-              <a:rPr lang="fr-FR" dirty="0" smtClean="0"/>
-              <a:t> model</a:t>
-            </a:r>
-          </a:p>
-          <a:p>
-            <a:pPr lvl="2"/>
-            <a:r>
-              <a:rPr lang="fr-FR" dirty="0" err="1" smtClean="0"/>
-              <a:t>Simulating</a:t>
-            </a:r>
-            <a:r>
-              <a:rPr lang="fr-FR" dirty="0" smtClean="0"/>
-              <a:t> model</a:t>
-            </a:r>
-          </a:p>
-          <a:p>
-            <a:pPr lvl="1"/>
-            <a:r>
-              <a:rPr lang="fr-FR" dirty="0" smtClean="0"/>
-              <a:t>Set </a:t>
-            </a:r>
-            <a:r>
-              <a:rPr lang="fr-FR" dirty="0" err="1" smtClean="0"/>
-              <a:t>Parameters</a:t>
-            </a:r>
-            <a:r>
-              <a:rPr lang="fr-FR" dirty="0" smtClean="0"/>
-              <a:t> :</a:t>
-            </a:r>
-          </a:p>
-          <a:p>
-            <a:pPr lvl="2"/>
-            <a:r>
-              <a:rPr lang="fr-FR" dirty="0" smtClean="0"/>
-              <a:t>Simulation time</a:t>
-            </a:r>
-          </a:p>
-          <a:p>
-            <a:pPr lvl="2"/>
-            <a:r>
-              <a:rPr lang="fr-FR" dirty="0" err="1" smtClean="0"/>
-              <a:t>Solver</a:t>
-            </a:r>
-            <a:endParaRPr lang="fr-FR" dirty="0" smtClean="0"/>
-          </a:p>
-          <a:p>
-            <a:pPr lvl="2"/>
-            <a:r>
-              <a:rPr lang="fr-FR" dirty="0" err="1" smtClean="0"/>
-              <a:t>Tolerances</a:t>
-            </a:r>
-            <a:endParaRPr lang="fr-FR" dirty="0" smtClean="0"/>
-          </a:p>
-          <a:p>
-            <a:pPr lvl="2"/>
-            <a:r>
-              <a:rPr lang="fr-FR" dirty="0" smtClean="0"/>
-              <a:t>…</a:t>
-            </a:r>
-            <a:endParaRPr lang="fr-FR" dirty="0"/>
           </a:p>
         </p:txBody>
       </p:sp>
@@ -34979,6 +34969,229 @@
               <a:rPr lang="fr-FR" dirty="0" err="1" smtClean="0">
                 <a:hlinkClick r:id="rId2" action="ppaction://hlinkfile"/>
               </a:rPr>
+              <a:t>ModPlusCtrl</a:t>
+            </a:r>
+            <a:endParaRPr lang="fr-FR" dirty="0"/>
+          </a:p>
+        </p:txBody>
+      </p:sp>
+      <p:sp>
+        <p:nvSpPr>
+          <p:cNvPr id="4" name="Espace réservé du contenu 3"/>
+          <p:cNvSpPr>
+            <a:spLocks noGrp="1"/>
+          </p:cNvSpPr>
+          <p:nvPr>
+            <p:ph idx="1"/>
+          </p:nvPr>
+        </p:nvSpPr>
+        <p:spPr>
+          <a:xfrm>
+            <a:off x="395536" y="1412776"/>
+            <a:ext cx="8291264" cy="4713387"/>
+          </a:xfrm>
+        </p:spPr>
+        <p:txBody>
+          <a:bodyPr>
+            <a:normAutofit fontScale="92500" lnSpcReduction="20000"/>
+          </a:bodyPr>
+          <a:lstStyle/>
+          <a:p>
+            <a:r>
+              <a:rPr lang="fr-FR" dirty="0" smtClean="0"/>
+              <a:t>Simulation software </a:t>
+            </a:r>
+            <a:r>
+              <a:rPr lang="fr-FR" dirty="0" err="1" smtClean="0"/>
+              <a:t>controler</a:t>
+            </a:r>
+            <a:r>
+              <a:rPr lang="fr-FR" dirty="0" smtClean="0"/>
+              <a:t> :</a:t>
+            </a:r>
+          </a:p>
+          <a:p>
+            <a:pPr lvl="1"/>
+            <a:r>
+              <a:rPr lang="fr-FR" dirty="0" err="1" smtClean="0"/>
+              <a:t>Specific</a:t>
+            </a:r>
+            <a:r>
+              <a:rPr lang="fr-FR" dirty="0" smtClean="0"/>
+              <a:t> for </a:t>
+            </a:r>
+            <a:r>
+              <a:rPr lang="fr-FR" dirty="0" err="1" smtClean="0"/>
+              <a:t>each</a:t>
+            </a:r>
+            <a:r>
+              <a:rPr lang="fr-FR" dirty="0" smtClean="0"/>
+              <a:t> simulation software</a:t>
+            </a:r>
+          </a:p>
+          <a:p>
+            <a:pPr lvl="1"/>
+            <a:r>
+              <a:rPr lang="fr-FR" dirty="0" err="1" smtClean="0"/>
+              <a:t>Provide</a:t>
+            </a:r>
+            <a:r>
+              <a:rPr lang="fr-FR" dirty="0" smtClean="0"/>
+              <a:t> interface </a:t>
+            </a:r>
+            <a:r>
+              <a:rPr lang="fr-FR" dirty="0" err="1" smtClean="0"/>
+              <a:t>functions</a:t>
+            </a:r>
+            <a:r>
+              <a:rPr lang="fr-FR" dirty="0" smtClean="0"/>
+              <a:t> :</a:t>
+            </a:r>
+          </a:p>
+          <a:p>
+            <a:pPr lvl="2"/>
+            <a:r>
+              <a:rPr lang="fr-FR" dirty="0" smtClean="0"/>
+              <a:t>Set simulation </a:t>
+            </a:r>
+            <a:r>
+              <a:rPr lang="fr-FR" dirty="0" err="1" smtClean="0"/>
+              <a:t>parameters</a:t>
+            </a:r>
+            <a:endParaRPr lang="fr-FR" dirty="0" smtClean="0"/>
+          </a:p>
+          <a:p>
+            <a:pPr lvl="2"/>
+            <a:r>
+              <a:rPr lang="fr-FR" dirty="0" err="1" smtClean="0"/>
+              <a:t>Writing</a:t>
+            </a:r>
+            <a:r>
+              <a:rPr lang="fr-FR" dirty="0" smtClean="0"/>
+              <a:t> / Reading variables</a:t>
+            </a:r>
+          </a:p>
+          <a:p>
+            <a:pPr lvl="2"/>
+            <a:r>
+              <a:rPr lang="fr-FR" dirty="0" err="1" smtClean="0"/>
+              <a:t>Compiling</a:t>
+            </a:r>
+            <a:r>
+              <a:rPr lang="fr-FR" dirty="0" smtClean="0"/>
+              <a:t> model</a:t>
+            </a:r>
+          </a:p>
+          <a:p>
+            <a:pPr lvl="2"/>
+            <a:r>
+              <a:rPr lang="fr-FR" dirty="0" err="1" smtClean="0"/>
+              <a:t>Simulating</a:t>
+            </a:r>
+            <a:r>
+              <a:rPr lang="fr-FR" dirty="0" smtClean="0"/>
+              <a:t> model</a:t>
+            </a:r>
+          </a:p>
+          <a:p>
+            <a:pPr lvl="1"/>
+            <a:r>
+              <a:rPr lang="fr-FR" dirty="0" smtClean="0"/>
+              <a:t>Set </a:t>
+            </a:r>
+            <a:r>
+              <a:rPr lang="fr-FR" dirty="0" err="1" smtClean="0"/>
+              <a:t>Parameters</a:t>
+            </a:r>
+            <a:r>
+              <a:rPr lang="fr-FR" dirty="0" smtClean="0"/>
+              <a:t> :</a:t>
+            </a:r>
+          </a:p>
+          <a:p>
+            <a:pPr lvl="2"/>
+            <a:r>
+              <a:rPr lang="fr-FR" dirty="0" smtClean="0"/>
+              <a:t>Simulation time</a:t>
+            </a:r>
+          </a:p>
+          <a:p>
+            <a:pPr lvl="2"/>
+            <a:r>
+              <a:rPr lang="fr-FR" dirty="0" err="1" smtClean="0"/>
+              <a:t>Solver</a:t>
+            </a:r>
+            <a:endParaRPr lang="fr-FR" dirty="0" smtClean="0"/>
+          </a:p>
+          <a:p>
+            <a:pPr lvl="2"/>
+            <a:r>
+              <a:rPr lang="fr-FR" dirty="0" err="1" smtClean="0"/>
+              <a:t>Tolerances</a:t>
+            </a:r>
+            <a:endParaRPr lang="fr-FR" dirty="0" smtClean="0"/>
+          </a:p>
+          <a:p>
+            <a:pPr lvl="2"/>
+            <a:r>
+              <a:rPr lang="fr-FR" dirty="0" smtClean="0"/>
+              <a:t>…</a:t>
+            </a:r>
+            <a:endParaRPr lang="fr-FR" dirty="0"/>
+          </a:p>
+        </p:txBody>
+      </p:sp>
+    </p:spTree>
+  </p:cSld>
+  <p:clrMapOvr>
+    <a:masterClrMapping/>
+  </p:clrMapOvr>
+  <p:timing>
+    <p:tnLst>
+      <p:par>
+        <p:cTn id="1" dur="indefinite" restart="never" nodeType="tmRoot"/>
+      </p:par>
+    </p:tnLst>
+  </p:timing>
+</p:sld>
+</file>
+
+<file path=ppt/slides/slide13.xml><?xml version="1.0" encoding="utf-8"?>
+<p:sld xmlns:a="http://schemas.openxmlformats.org/drawingml/2006/main" xmlns:r="http://schemas.openxmlformats.org/officeDocument/2006/relationships" xmlns:p="http://schemas.openxmlformats.org/presentationml/2006/main">
+  <p:cSld>
+    <p:spTree>
+      <p:nvGrpSpPr>
+        <p:cNvPr id="1" name=""/>
+        <p:cNvGrpSpPr/>
+        <p:nvPr/>
+      </p:nvGrpSpPr>
+      <p:grpSpPr>
+        <a:xfrm>
+          <a:off x="0" y="0"/>
+          <a:ext cx="0" cy="0"/>
+          <a:chOff x="0" y="0"/>
+          <a:chExt cx="0" cy="0"/>
+        </a:xfrm>
+      </p:grpSpPr>
+      <p:sp>
+        <p:nvSpPr>
+          <p:cNvPr id="2" name="Titre 1"/>
+          <p:cNvSpPr>
+            <a:spLocks noGrp="1"/>
+          </p:cNvSpPr>
+          <p:nvPr>
+            <p:ph type="title"/>
+          </p:nvPr>
+        </p:nvSpPr>
+        <p:spPr/>
+        <p:txBody>
+          <a:bodyPr/>
+          <a:lstStyle/>
+          <a:p>
+            <a:r>
+              <a:rPr lang="fr-FR" dirty="0" err="1" smtClean="0">
+                <a:hlinkClick r:id="rId2" action="ppaction://hlinkfile"/>
+              </a:rPr>
               <a:t>ModReader</a:t>
             </a:r>
             <a:r>
@@ -35269,7 +35482,7 @@
 </p:sld>
 </file>
 
-<file path=ppt/slides/slide13.xml><?xml version="1.0" encoding="utf-8"?>
+<file path=ppt/slides/slide14.xml><?xml version="1.0" encoding="utf-8"?>
 <p:sld xmlns:a="http://schemas.openxmlformats.org/drawingml/2006/main" xmlns:r="http://schemas.openxmlformats.org/officeDocument/2006/relationships" xmlns:p="http://schemas.openxmlformats.org/presentationml/2006/main">
   <p:cSld>
     <p:spTree>
@@ -35890,7 +36103,7 @@
 </p:sld>
 </file>
 
-<file path=ppt/slides/slide14.xml><?xml version="1.0" encoding="utf-8"?>
+<file path=ppt/slides/slide15.xml><?xml version="1.0" encoding="utf-8"?>
 <p:sld xmlns:a="http://schemas.openxmlformats.org/drawingml/2006/main" xmlns:r="http://schemas.openxmlformats.org/officeDocument/2006/relationships" xmlns:p="http://schemas.openxmlformats.org/presentationml/2006/main">
   <p:cSld>
     <p:spTree>
@@ -35957,7 +36170,7 @@
 </p:sld>
 </file>
 
-<file path=ppt/slides/slide15.xml><?xml version="1.0" encoding="utf-8"?>
+<file path=ppt/slides/slide16.xml><?xml version="1.0" encoding="utf-8"?>
 <p:sld xmlns:a="http://schemas.openxmlformats.org/drawingml/2006/main" xmlns:r="http://schemas.openxmlformats.org/officeDocument/2006/relationships" xmlns:p="http://schemas.openxmlformats.org/presentationml/2006/main">
   <p:cSld>
     <p:spTree>
@@ -36388,7 +36601,7 @@
 </p:sld>
 </file>
 
-<file path=ppt/slides/slide16.xml><?xml version="1.0" encoding="utf-8"?>
+<file path=ppt/slides/slide17.xml><?xml version="1.0" encoding="utf-8"?>
 <p:sld xmlns:a="http://schemas.openxmlformats.org/drawingml/2006/main" xmlns:r="http://schemas.openxmlformats.org/officeDocument/2006/relationships" xmlns:p="http://schemas.openxmlformats.org/presentationml/2006/main">
   <p:cSld>
     <p:spTree>
@@ -36571,7 +36784,7 @@
 </p:sld>
 </file>
 
-<file path=ppt/slides/slide17.xml><?xml version="1.0" encoding="utf-8"?>
+<file path=ppt/slides/slide18.xml><?xml version="1.0" encoding="utf-8"?>
 <p:sld xmlns:a="http://schemas.openxmlformats.org/drawingml/2006/main" xmlns:r="http://schemas.openxmlformats.org/officeDocument/2006/relationships" xmlns:p="http://schemas.openxmlformats.org/presentationml/2006/main">
   <p:cSld>
     <p:spTree>
@@ -36909,7 +37122,7 @@
 </p:sld>
 </file>
 
-<file path=ppt/slides/slide18.xml><?xml version="1.0" encoding="utf-8"?>
+<file path=ppt/slides/slide19.xml><?xml version="1.0" encoding="utf-8"?>
 <p:sld xmlns:a="http://schemas.openxmlformats.org/drawingml/2006/main" xmlns:r="http://schemas.openxmlformats.org/officeDocument/2006/relationships" xmlns:p="http://schemas.openxmlformats.org/presentationml/2006/main">
   <p:cSld>
     <p:spTree>
@@ -37078,7 +37291,127 @@
 </p:sld>
 </file>
 
-<file path=ppt/slides/slide19.xml><?xml version="1.0" encoding="utf-8"?>
+<file path=ppt/slides/slide2.xml><?xml version="1.0" encoding="utf-8"?>
+<p:sld xmlns:a="http://schemas.openxmlformats.org/drawingml/2006/main" xmlns:r="http://schemas.openxmlformats.org/officeDocument/2006/relationships" xmlns:p="http://schemas.openxmlformats.org/presentationml/2006/main">
+  <p:cSld>
+    <p:spTree>
+      <p:nvGrpSpPr>
+        <p:cNvPr id="1" name=""/>
+        <p:cNvGrpSpPr/>
+        <p:nvPr/>
+      </p:nvGrpSpPr>
+      <p:grpSpPr>
+        <a:xfrm>
+          <a:off x="0" y="0"/>
+          <a:ext cx="0" cy="0"/>
+          <a:chOff x="0" y="0"/>
+          <a:chExt cx="0" cy="0"/>
+        </a:xfrm>
+      </p:grpSpPr>
+      <p:sp>
+        <p:nvSpPr>
+          <p:cNvPr id="4" name="Titre 3"/>
+          <p:cNvSpPr>
+            <a:spLocks noGrp="1"/>
+          </p:cNvSpPr>
+          <p:nvPr>
+            <p:ph type="title"/>
+          </p:nvPr>
+        </p:nvSpPr>
+        <p:spPr/>
+        <p:txBody>
+          <a:bodyPr/>
+          <a:lstStyle/>
+          <a:p>
+            <a:r>
+              <a:rPr lang="fr-FR" dirty="0" err="1" smtClean="0"/>
+              <a:t>OMOptim</a:t>
+            </a:r>
+            <a:endParaRPr lang="fr-FR" dirty="0"/>
+          </a:p>
+        </p:txBody>
+      </p:sp>
+      <p:sp>
+        <p:nvSpPr>
+          <p:cNvPr id="5" name="Espace réservé du contenu 4"/>
+          <p:cNvSpPr>
+            <a:spLocks noGrp="1"/>
+          </p:cNvSpPr>
+          <p:nvPr>
+            <p:ph idx="1"/>
+          </p:nvPr>
+        </p:nvSpPr>
+        <p:spPr/>
+        <p:txBody>
+          <a:bodyPr/>
+          <a:lstStyle/>
+          <a:p>
+            <a:r>
+              <a:rPr lang="fr-FR" dirty="0" smtClean="0"/>
+              <a:t>C++ code</a:t>
+            </a:r>
+          </a:p>
+          <a:p>
+            <a:r>
+              <a:rPr lang="fr-FR" dirty="0" err="1" smtClean="0"/>
+              <a:t>Stored</a:t>
+            </a:r>
+            <a:r>
+              <a:rPr lang="fr-FR" dirty="0" smtClean="0"/>
+              <a:t> on subversion </a:t>
+            </a:r>
+            <a:r>
+              <a:rPr lang="fr-FR" dirty="0" err="1" smtClean="0"/>
+              <a:t>solver</a:t>
+            </a:r>
+            <a:endParaRPr lang="fr-FR" dirty="0" smtClean="0"/>
+          </a:p>
+          <a:p>
+            <a:r>
+              <a:rPr lang="fr-FR" dirty="0" err="1" smtClean="0"/>
+              <a:t>Using</a:t>
+            </a:r>
+            <a:r>
+              <a:rPr lang="fr-FR" dirty="0" smtClean="0"/>
+              <a:t> </a:t>
+            </a:r>
+            <a:r>
+              <a:rPr lang="fr-FR" dirty="0" err="1" smtClean="0"/>
+              <a:t>Qt</a:t>
+            </a:r>
+            <a:r>
+              <a:rPr lang="fr-FR" dirty="0" smtClean="0"/>
+              <a:t> </a:t>
+            </a:r>
+            <a:r>
+              <a:rPr lang="fr-FR" dirty="0" err="1" smtClean="0"/>
+              <a:t>libraries</a:t>
+            </a:r>
+            <a:r>
+              <a:rPr lang="fr-FR" dirty="0" smtClean="0"/>
+              <a:t> (GUI, Model/</a:t>
+            </a:r>
+            <a:r>
+              <a:rPr lang="fr-FR" dirty="0" err="1" smtClean="0"/>
+              <a:t>View</a:t>
+            </a:r>
+            <a:r>
+              <a:rPr lang="fr-FR" dirty="0" smtClean="0"/>
+              <a:t>, Containers, Threads, XML…)</a:t>
+            </a:r>
+            <a:endParaRPr lang="fr-FR" dirty="0"/>
+          </a:p>
+        </p:txBody>
+      </p:sp>
+    </p:spTree>
+  </p:cSld>
+  <p:clrMapOvr>
+    <a:masterClrMapping/>
+  </p:clrMapOvr>
+</p:sld>
+</file>
+
+<file path=ppt/slides/slide20.xml><?xml version="1.0" encoding="utf-8"?>
 <p:sld xmlns:a="http://schemas.openxmlformats.org/drawingml/2006/main" xmlns:r="http://schemas.openxmlformats.org/officeDocument/2006/relationships" xmlns:p="http://schemas.openxmlformats.org/presentationml/2006/main">
   <p:cSld>
     <p:spTree>
@@ -37217,7 +37550,7 @@
         <p:spPr>
           <a:xfrm>
             <a:off x="6228184" y="2276872"/>
-            <a:ext cx="2232248" cy="936104"/>
+            <a:ext cx="2520280" cy="936104"/>
           </a:xfrm>
           <a:prstGeom prst="roundRect">
             <a:avLst/>
@@ -37264,16 +37597,8 @@
               <a:buChar char="-"/>
             </a:pPr>
             <a:r>
-              <a:rPr lang="fr-FR" dirty="0" err="1" smtClean="0"/>
-              <a:t>PluginEI</a:t>
-            </a:r>
-            <a:endParaRPr lang="fr-FR" dirty="0" smtClean="0"/>
-          </a:p>
-          <a:p>
-            <a:pPr algn="ctr"/>
-            <a:r>
               <a:rPr lang="fr-FR" dirty="0" smtClean="0"/>
-              <a:t>.dll</a:t>
+              <a:t>PluginEI.dll</a:t>
             </a:r>
             <a:endParaRPr lang="fr-FR" dirty="0"/>
           </a:p>
@@ -37288,7 +37613,7 @@
         <p:spPr>
           <a:xfrm>
             <a:off x="6228184" y="3429000"/>
-            <a:ext cx="2232248" cy="936104"/>
+            <a:ext cx="2520280" cy="936104"/>
           </a:xfrm>
           <a:prstGeom prst="roundRect">
             <a:avLst/>
@@ -37544,7 +37869,82 @@
 </p:sld>
 </file>
 
-<file path=ppt/slides/slide2.xml><?xml version="1.0" encoding="utf-8"?>
+<file path=ppt/slides/slide21.xml><?xml version="1.0" encoding="utf-8"?>
+<p:sld xmlns:a="http://schemas.openxmlformats.org/drawingml/2006/main" xmlns:r="http://schemas.openxmlformats.org/officeDocument/2006/relationships" xmlns:p="http://schemas.openxmlformats.org/presentationml/2006/main">
+  <p:cSld>
+    <p:spTree>
+      <p:nvGrpSpPr>
+        <p:cNvPr id="1" name=""/>
+        <p:cNvGrpSpPr/>
+        <p:nvPr/>
+      </p:nvGrpSpPr>
+      <p:grpSpPr>
+        <a:xfrm>
+          <a:off x="0" y="0"/>
+          <a:ext cx="0" cy="0"/>
+          <a:chOff x="0" y="0"/>
+          <a:chExt cx="0" cy="0"/>
+        </a:xfrm>
+      </p:grpSpPr>
+      <p:sp>
+        <p:nvSpPr>
+          <p:cNvPr id="3" name="Titre 2"/>
+          <p:cNvSpPr>
+            <a:spLocks noGrp="1"/>
+          </p:cNvSpPr>
+          <p:nvPr>
+            <p:ph type="title"/>
+          </p:nvPr>
+        </p:nvSpPr>
+        <p:spPr/>
+        <p:txBody>
+          <a:bodyPr/>
+          <a:lstStyle/>
+          <a:p>
+            <a:r>
+              <a:rPr lang="fr-FR" dirty="0" err="1" smtClean="0"/>
+              <a:t>Energy</a:t>
+            </a:r>
+            <a:r>
+              <a:rPr lang="fr-FR" dirty="0" smtClean="0"/>
+              <a:t> </a:t>
+            </a:r>
+            <a:r>
+              <a:rPr lang="fr-FR" dirty="0" err="1" smtClean="0"/>
+              <a:t>integration</a:t>
+            </a:r>
+            <a:endParaRPr lang="fr-FR" dirty="0"/>
+          </a:p>
+        </p:txBody>
+      </p:sp>
+      <p:sp>
+        <p:nvSpPr>
+          <p:cNvPr id="4" name="Espace réservé du texte 3"/>
+          <p:cNvSpPr>
+            <a:spLocks noGrp="1"/>
+          </p:cNvSpPr>
+          <p:nvPr>
+            <p:ph type="body" idx="1"/>
+          </p:nvPr>
+        </p:nvSpPr>
+        <p:spPr/>
+        <p:txBody>
+          <a:bodyPr/>
+          <a:lstStyle/>
+          <a:p>
+            <a:endParaRPr lang="fr-FR"/>
+          </a:p>
+        </p:txBody>
+      </p:sp>
+    </p:spTree>
+  </p:cSld>
+  <p:clrMapOvr>
+    <a:masterClrMapping/>
+  </p:clrMapOvr>
+</p:sld>
+</file>
+
+<file path=ppt/slides/slide22.xml><?xml version="1.0" encoding="utf-8"?>
 <p:sld xmlns:a="http://schemas.openxmlformats.org/drawingml/2006/main" xmlns:r="http://schemas.openxmlformats.org/officeDocument/2006/relationships" xmlns:p="http://schemas.openxmlformats.org/presentationml/2006/main">
   <p:cSld>
     <p:spTree>
@@ -37578,7 +37978,15 @@
           <a:p>
             <a:r>
               <a:rPr lang="fr-FR" dirty="0" err="1" smtClean="0"/>
-              <a:t>OMOptim</a:t>
+              <a:t>Energy</a:t>
+            </a:r>
+            <a:r>
+              <a:rPr lang="fr-FR" dirty="0" smtClean="0"/>
+              <a:t> </a:t>
+            </a:r>
+            <a:r>
+              <a:rPr lang="fr-FR" dirty="0" err="1" smtClean="0"/>
+              <a:t>integration</a:t>
             </a:r>
             <a:endParaRPr lang="fr-FR" dirty="0"/>
           </a:p>
@@ -37601,28 +38009,39 @@
           <a:p>
             <a:r>
               <a:rPr lang="fr-FR" dirty="0" smtClean="0"/>
-              <a:t>C++ code</a:t>
-            </a:r>
-          </a:p>
-          <a:p>
+              <a:t>EI </a:t>
+            </a:r>
             <a:r>
               <a:rPr lang="fr-FR" dirty="0" err="1" smtClean="0"/>
-              <a:t>Stored</a:t>
+              <a:t>is</a:t>
             </a:r>
             <a:r>
               <a:rPr lang="fr-FR" dirty="0" smtClean="0"/>
-              <a:t> on subversion </a:t>
+              <a:t> a plugin </a:t>
             </a:r>
             <a:r>
               <a:rPr lang="fr-FR" dirty="0" err="1" smtClean="0"/>
-              <a:t>solver</a:t>
+              <a:t>offering</a:t>
+            </a:r>
+            <a:r>
+              <a:rPr lang="fr-FR" dirty="0" smtClean="0"/>
+              <a:t> new </a:t>
+            </a:r>
+            <a:r>
+              <a:rPr lang="fr-FR" dirty="0" err="1" smtClean="0"/>
+              <a:t>problems</a:t>
             </a:r>
             <a:endParaRPr lang="fr-FR" dirty="0" smtClean="0"/>
           </a:p>
           <a:p>
+            <a:pPr lvl="1"/>
+            <a:r>
+              <a:rPr lang="fr-FR" dirty="0" smtClean="0"/>
+              <a:t>EIMER : Minimum </a:t>
+            </a:r>
             <a:r>
               <a:rPr lang="fr-FR" dirty="0" err="1" smtClean="0"/>
-              <a:t>Using</a:t>
+              <a:t>energy</a:t>
             </a:r>
             <a:r>
               <a:rPr lang="fr-FR" dirty="0" smtClean="0"/>
@@ -37630,7 +38049,35 @@
             </a:r>
             <a:r>
               <a:rPr lang="fr-FR" dirty="0" err="1" smtClean="0"/>
-              <a:t>Qt</a:t>
+              <a:t>requirement</a:t>
+            </a:r>
+            <a:endParaRPr lang="fr-FR" dirty="0" smtClean="0"/>
+          </a:p>
+          <a:p>
+            <a:pPr lvl="1"/>
+            <a:r>
+              <a:rPr lang="fr-FR" dirty="0" err="1" smtClean="0"/>
+              <a:t>EITarget</a:t>
+            </a:r>
+            <a:r>
+              <a:rPr lang="fr-FR" dirty="0" smtClean="0"/>
+              <a:t> : Utilities </a:t>
+            </a:r>
+            <a:r>
+              <a:rPr lang="fr-FR" dirty="0" err="1" smtClean="0"/>
+              <a:t>targetting</a:t>
+            </a:r>
+            <a:endParaRPr lang="fr-FR" dirty="0" smtClean="0"/>
+          </a:p>
+          <a:p>
+            <a:pPr lvl="1"/>
+            <a:r>
+              <a:rPr lang="fr-FR" dirty="0" smtClean="0"/>
+              <a:t>EIHEN1 : </a:t>
+            </a:r>
+            <a:r>
+              <a:rPr lang="fr-FR" dirty="0" err="1" smtClean="0"/>
+              <a:t>Heat</a:t>
             </a:r>
             <a:r>
               <a:rPr lang="fr-FR" dirty="0" smtClean="0"/>
@@ -37638,19 +38085,11 @@
             </a:r>
             <a:r>
               <a:rPr lang="fr-FR" dirty="0" err="1" smtClean="0"/>
-              <a:t>libraries</a:t>
+              <a:t>Exchanger</a:t>
             </a:r>
             <a:r>
               <a:rPr lang="fr-FR" dirty="0" smtClean="0"/>
-              <a:t> (GUI, Model/</a:t>
-            </a:r>
-            <a:r>
-              <a:rPr lang="fr-FR" dirty="0" err="1" smtClean="0"/>
-              <a:t>View</a:t>
-            </a:r>
-            <a:r>
-              <a:rPr lang="fr-FR" dirty="0" smtClean="0"/>
-              <a:t>, Containers, Threads, XML…)</a:t>
+              <a:t> Network</a:t>
             </a:r>
             <a:endParaRPr lang="fr-FR" dirty="0"/>
           </a:p>
@@ -37664,241 +38103,7 @@
 </p:sld>
 </file>
 
-<file path=ppt/slides/slide20.xml><?xml version="1.0" encoding="utf-8"?>
-<p:sld xmlns:a="http://schemas.openxmlformats.org/drawingml/2006/main" xmlns:r="http://schemas.openxmlformats.org/officeDocument/2006/relationships" xmlns:p="http://schemas.openxmlformats.org/presentationml/2006/main">
-  <p:cSld>
-    <p:spTree>
-      <p:nvGrpSpPr>
-        <p:cNvPr id="1" name=""/>
-        <p:cNvGrpSpPr/>
-        <p:nvPr/>
-      </p:nvGrpSpPr>
-      <p:grpSpPr>
-        <a:xfrm>
-          <a:off x="0" y="0"/>
-          <a:ext cx="0" cy="0"/>
-          <a:chOff x="0" y="0"/>
-          <a:chExt cx="0" cy="0"/>
-        </a:xfrm>
-      </p:grpSpPr>
-      <p:sp>
-        <p:nvSpPr>
-          <p:cNvPr id="3" name="Titre 2"/>
-          <p:cNvSpPr>
-            <a:spLocks noGrp="1"/>
-          </p:cNvSpPr>
-          <p:nvPr>
-            <p:ph type="title"/>
-          </p:nvPr>
-        </p:nvSpPr>
-        <p:spPr/>
-        <p:txBody>
-          <a:bodyPr/>
-          <a:lstStyle/>
-          <a:p>
-            <a:r>
-              <a:rPr lang="fr-FR" dirty="0" err="1" smtClean="0"/>
-              <a:t>Energy</a:t>
-            </a:r>
-            <a:r>
-              <a:rPr lang="fr-FR" dirty="0" smtClean="0"/>
-              <a:t> </a:t>
-            </a:r>
-            <a:r>
-              <a:rPr lang="fr-FR" dirty="0" err="1" smtClean="0"/>
-              <a:t>integration</a:t>
-            </a:r>
-            <a:endParaRPr lang="fr-FR" dirty="0"/>
-          </a:p>
-        </p:txBody>
-      </p:sp>
-      <p:sp>
-        <p:nvSpPr>
-          <p:cNvPr id="4" name="Espace réservé du texte 3"/>
-          <p:cNvSpPr>
-            <a:spLocks noGrp="1"/>
-          </p:cNvSpPr>
-          <p:nvPr>
-            <p:ph type="body" idx="1"/>
-          </p:nvPr>
-        </p:nvSpPr>
-        <p:spPr/>
-        <p:txBody>
-          <a:bodyPr/>
-          <a:lstStyle/>
-          <a:p>
-            <a:endParaRPr lang="fr-FR"/>
-          </a:p>
-        </p:txBody>
-      </p:sp>
-    </p:spTree>
-  </p:cSld>
-  <p:clrMapOvr>
-    <a:masterClrMapping/>
-  </p:clrMapOvr>
-</p:sld>
-</file>
-
-<file path=ppt/slides/slide21.xml><?xml version="1.0" encoding="utf-8"?>
-<p:sld xmlns:a="http://schemas.openxmlformats.org/drawingml/2006/main" xmlns:r="http://schemas.openxmlformats.org/officeDocument/2006/relationships" xmlns:p="http://schemas.openxmlformats.org/presentationml/2006/main">
-  <p:cSld>
-    <p:spTree>
-      <p:nvGrpSpPr>
-        <p:cNvPr id="1" name=""/>
-        <p:cNvGrpSpPr/>
-        <p:nvPr/>
-      </p:nvGrpSpPr>
-      <p:grpSpPr>
-        <a:xfrm>
-          <a:off x="0" y="0"/>
-          <a:ext cx="0" cy="0"/>
-          <a:chOff x="0" y="0"/>
-          <a:chExt cx="0" cy="0"/>
-        </a:xfrm>
-      </p:grpSpPr>
-      <p:sp>
-        <p:nvSpPr>
-          <p:cNvPr id="4" name="Titre 3"/>
-          <p:cNvSpPr>
-            <a:spLocks noGrp="1"/>
-          </p:cNvSpPr>
-          <p:nvPr>
-            <p:ph type="title"/>
-          </p:nvPr>
-        </p:nvSpPr>
-        <p:spPr/>
-        <p:txBody>
-          <a:bodyPr/>
-          <a:lstStyle/>
-          <a:p>
-            <a:r>
-              <a:rPr lang="fr-FR" dirty="0" err="1" smtClean="0"/>
-              <a:t>Energy</a:t>
-            </a:r>
-            <a:r>
-              <a:rPr lang="fr-FR" dirty="0" smtClean="0"/>
-              <a:t> </a:t>
-            </a:r>
-            <a:r>
-              <a:rPr lang="fr-FR" dirty="0" err="1" smtClean="0"/>
-              <a:t>integration</a:t>
-            </a:r>
-            <a:endParaRPr lang="fr-FR" dirty="0"/>
-          </a:p>
-        </p:txBody>
-      </p:sp>
-      <p:sp>
-        <p:nvSpPr>
-          <p:cNvPr id="5" name="Espace réservé du contenu 4"/>
-          <p:cNvSpPr>
-            <a:spLocks noGrp="1"/>
-          </p:cNvSpPr>
-          <p:nvPr>
-            <p:ph idx="1"/>
-          </p:nvPr>
-        </p:nvSpPr>
-        <p:spPr/>
-        <p:txBody>
-          <a:bodyPr/>
-          <a:lstStyle/>
-          <a:p>
-            <a:r>
-              <a:rPr lang="fr-FR" dirty="0" smtClean="0"/>
-              <a:t>EI </a:t>
-            </a:r>
-            <a:r>
-              <a:rPr lang="fr-FR" dirty="0" err="1" smtClean="0"/>
-              <a:t>is</a:t>
-            </a:r>
-            <a:r>
-              <a:rPr lang="fr-FR" dirty="0" smtClean="0"/>
-              <a:t> a plugin </a:t>
-            </a:r>
-            <a:r>
-              <a:rPr lang="fr-FR" dirty="0" err="1" smtClean="0"/>
-              <a:t>offering</a:t>
-            </a:r>
-            <a:r>
-              <a:rPr lang="fr-FR" dirty="0" smtClean="0"/>
-              <a:t> new </a:t>
-            </a:r>
-            <a:r>
-              <a:rPr lang="fr-FR" dirty="0" err="1" smtClean="0"/>
-              <a:t>problems</a:t>
-            </a:r>
-            <a:endParaRPr lang="fr-FR" dirty="0" smtClean="0"/>
-          </a:p>
-          <a:p>
-            <a:pPr lvl="1"/>
-            <a:r>
-              <a:rPr lang="fr-FR" dirty="0" smtClean="0"/>
-              <a:t>EIMER : Minimum </a:t>
-            </a:r>
-            <a:r>
-              <a:rPr lang="fr-FR" dirty="0" err="1" smtClean="0"/>
-              <a:t>energy</a:t>
-            </a:r>
-            <a:r>
-              <a:rPr lang="fr-FR" dirty="0" smtClean="0"/>
-              <a:t> </a:t>
-            </a:r>
-            <a:r>
-              <a:rPr lang="fr-FR" dirty="0" err="1" smtClean="0"/>
-              <a:t>requirement</a:t>
-            </a:r>
-            <a:endParaRPr lang="fr-FR" dirty="0" smtClean="0"/>
-          </a:p>
-          <a:p>
-            <a:pPr lvl="1"/>
-            <a:r>
-              <a:rPr lang="fr-FR" dirty="0" err="1" smtClean="0"/>
-              <a:t>EITarget</a:t>
-            </a:r>
-            <a:r>
-              <a:rPr lang="fr-FR" dirty="0" smtClean="0"/>
-              <a:t> : Utilities </a:t>
-            </a:r>
-            <a:r>
-              <a:rPr lang="fr-FR" dirty="0" err="1" smtClean="0"/>
-              <a:t>targetting</a:t>
-            </a:r>
-            <a:endParaRPr lang="fr-FR" dirty="0" smtClean="0"/>
-          </a:p>
-          <a:p>
-            <a:pPr lvl="1"/>
-            <a:r>
-              <a:rPr lang="fr-FR" dirty="0" smtClean="0"/>
-              <a:t>EIHEN1 : </a:t>
-            </a:r>
-            <a:r>
-              <a:rPr lang="fr-FR" dirty="0" err="1" smtClean="0"/>
-              <a:t>Heat</a:t>
-            </a:r>
-            <a:r>
-              <a:rPr lang="fr-FR" dirty="0" smtClean="0"/>
-              <a:t> </a:t>
-            </a:r>
-            <a:r>
-              <a:rPr lang="fr-FR" dirty="0" err="1" smtClean="0"/>
-              <a:t>Exchanger</a:t>
-            </a:r>
-            <a:r>
-              <a:rPr lang="fr-FR" dirty="0" smtClean="0"/>
-              <a:t> Network</a:t>
-            </a:r>
-            <a:endParaRPr lang="fr-FR" dirty="0"/>
-          </a:p>
-        </p:txBody>
-      </p:sp>
-    </p:spTree>
-  </p:cSld>
-  <p:clrMapOvr>
-    <a:masterClrMapping/>
-  </p:clrMapOvr>
-</p:sld>
-</file>
-
-<file path=ppt/slides/slide22.xml><?xml version="1.0" encoding="utf-8"?>
+<file path=ppt/slides/slide23.xml><?xml version="1.0" encoding="utf-8"?>
 <p:sld xmlns:a="http://schemas.openxmlformats.org/drawingml/2006/main" xmlns:r="http://schemas.openxmlformats.org/officeDocument/2006/relationships" xmlns:p="http://schemas.openxmlformats.org/presentationml/2006/main">
   <p:cSld>
     <p:spTree>
@@ -37925,7 +38130,12 @@
             <p:ph type="title"/>
           </p:nvPr>
         </p:nvSpPr>
-        <p:spPr/>
+        <p:spPr>
+          <a:xfrm>
+            <a:off x="467544" y="0"/>
+            <a:ext cx="8229600" cy="1143000"/>
+          </a:xfrm>
+        </p:spPr>
         <p:txBody>
           <a:bodyPr/>
           <a:lstStyle/>
@@ -38124,8 +38334,8 @@
         </p:nvSpPr>
         <p:spPr>
           <a:xfrm>
-            <a:off x="3707904" y="1052736"/>
-            <a:ext cx="1224136" cy="1224136"/>
+            <a:off x="3851920" y="1052736"/>
+            <a:ext cx="1368152" cy="912101"/>
           </a:xfrm>
           <a:prstGeom prst="ellipse">
             <a:avLst/>
@@ -38153,10 +38363,10 @@
           <a:p>
             <a:pPr algn="ctr"/>
             <a:r>
-              <a:rPr lang="fr-FR" dirty="0" err="1" smtClean="0"/>
+              <a:rPr lang="fr-FR" sz="1600" dirty="0" err="1" smtClean="0"/>
               <a:t>ModPlusCtrl</a:t>
             </a:r>
-            <a:endParaRPr lang="fr-FR" dirty="0"/>
+            <a:endParaRPr lang="fr-FR" sz="1600" dirty="0"/>
           </a:p>
         </p:txBody>
       </p:sp>
@@ -38168,8 +38378,8 @@
         </p:nvSpPr>
         <p:spPr>
           <a:xfrm>
-            <a:off x="4211960" y="2204864"/>
-            <a:ext cx="1224136" cy="1224136"/>
+            <a:off x="3851920" y="2420888"/>
+            <a:ext cx="1433302" cy="864096"/>
           </a:xfrm>
           <a:prstGeom prst="ellipse">
             <a:avLst/>
@@ -38197,10 +38407,10 @@
           <a:p>
             <a:pPr algn="ctr"/>
             <a:r>
-              <a:rPr lang="fr-FR" dirty="0" err="1" smtClean="0"/>
+              <a:rPr lang="fr-FR" sz="1600" dirty="0" err="1" smtClean="0"/>
               <a:t>MOOmc</a:t>
             </a:r>
-            <a:endParaRPr lang="fr-FR" dirty="0"/>
+            <a:endParaRPr lang="fr-FR" sz="1600" dirty="0"/>
           </a:p>
         </p:txBody>
       </p:sp>
@@ -38220,6 +38430,232 @@
           </a:graphicData>
         </a:graphic>
       </p:graphicFrame>
+      <p:cxnSp>
+        <p:nvCxnSpPr>
+          <p:cNvPr id="10" name="Forme 9"/>
+          <p:cNvCxnSpPr>
+            <a:stCxn id="6" idx="0"/>
+            <a:endCxn id="7" idx="2"/>
+          </p:cNvCxnSpPr>
+          <p:nvPr/>
+        </p:nvCxnSpPr>
+        <p:spPr>
+          <a:xfrm rot="5400000" flipH="1" flipV="1">
+            <a:off x="1811694" y="1172750"/>
+            <a:ext cx="1704189" cy="2376264"/>
+          </a:xfrm>
+          <a:prstGeom prst="curvedConnector2">
+            <a:avLst/>
+          </a:prstGeom>
+          <a:ln>
+            <a:headEnd type="arrow" w="med" len="med"/>
+            <a:tailEnd type="arrow" w="med" len="med"/>
+          </a:ln>
+        </p:spPr>
+        <p:style>
+          <a:lnRef idx="1">
+            <a:schemeClr val="accent1"/>
+          </a:lnRef>
+          <a:fillRef idx="0">
+            <a:schemeClr val="accent1"/>
+          </a:fillRef>
+          <a:effectRef idx="0">
+            <a:schemeClr val="accent1"/>
+          </a:effectRef>
+          <a:fontRef idx="minor">
+            <a:schemeClr val="tx1"/>
+          </a:fontRef>
+        </p:style>
+      </p:cxnSp>
+      <p:cxnSp>
+        <p:nvCxnSpPr>
+          <p:cNvPr id="12" name="Connecteur en arc 11"/>
+          <p:cNvCxnSpPr>
+            <a:stCxn id="7" idx="6"/>
+            <a:endCxn id="4" idx="1"/>
+          </p:cNvCxnSpPr>
+          <p:nvPr/>
+        </p:nvCxnSpPr>
+        <p:spPr>
+          <a:xfrm>
+            <a:off x="5220072" y="1508787"/>
+            <a:ext cx="1080120" cy="516057"/>
+          </a:xfrm>
+          <a:prstGeom prst="curvedConnector3">
+            <a:avLst>
+              <a:gd name="adj1" fmla="val 50000"/>
+            </a:avLst>
+          </a:prstGeom>
+          <a:ln>
+            <a:headEnd type="arrow" w="med" len="med"/>
+            <a:tailEnd type="arrow" w="med" len="med"/>
+          </a:ln>
+        </p:spPr>
+        <p:style>
+          <a:lnRef idx="1">
+            <a:schemeClr val="accent1"/>
+          </a:lnRef>
+          <a:fillRef idx="0">
+            <a:schemeClr val="accent1"/>
+          </a:fillRef>
+          <a:effectRef idx="0">
+            <a:schemeClr val="accent1"/>
+          </a:effectRef>
+          <a:fontRef idx="minor">
+            <a:schemeClr val="tx1"/>
+          </a:fontRef>
+        </p:style>
+      </p:cxnSp>
+      <p:cxnSp>
+        <p:nvCxnSpPr>
+          <p:cNvPr id="14" name="Connecteur en arc 13"/>
+          <p:cNvCxnSpPr>
+            <a:stCxn id="8" idx="6"/>
+            <a:endCxn id="4" idx="1"/>
+          </p:cNvCxnSpPr>
+          <p:nvPr/>
+        </p:nvCxnSpPr>
+        <p:spPr>
+          <a:xfrm flipV="1">
+            <a:off x="5285222" y="2024844"/>
+            <a:ext cx="1014970" cy="828092"/>
+          </a:xfrm>
+          <a:prstGeom prst="curvedConnector3">
+            <a:avLst>
+              <a:gd name="adj1" fmla="val 50000"/>
+            </a:avLst>
+          </a:prstGeom>
+          <a:ln>
+            <a:headEnd type="arrow" w="med" len="med"/>
+            <a:tailEnd type="arrow" w="med" len="med"/>
+          </a:ln>
+        </p:spPr>
+        <p:style>
+          <a:lnRef idx="1">
+            <a:schemeClr val="accent1"/>
+          </a:lnRef>
+          <a:fillRef idx="0">
+            <a:schemeClr val="accent1"/>
+          </a:fillRef>
+          <a:effectRef idx="0">
+            <a:schemeClr val="accent1"/>
+          </a:effectRef>
+          <a:fontRef idx="minor">
+            <a:schemeClr val="tx1"/>
+          </a:fontRef>
+        </p:style>
+      </p:cxnSp>
+      <p:cxnSp>
+        <p:nvCxnSpPr>
+          <p:cNvPr id="17" name="Forme 16"/>
+          <p:cNvCxnSpPr>
+            <a:stCxn id="6" idx="0"/>
+            <a:endCxn id="8" idx="2"/>
+          </p:cNvCxnSpPr>
+          <p:nvPr/>
+        </p:nvCxnSpPr>
+        <p:spPr>
+          <a:xfrm rot="5400000" flipH="1" flipV="1">
+            <a:off x="2483768" y="1844824"/>
+            <a:ext cx="360040" cy="2376264"/>
+          </a:xfrm>
+          <a:prstGeom prst="curvedConnector2">
+            <a:avLst/>
+          </a:prstGeom>
+          <a:ln>
+            <a:headEnd type="arrow" w="med" len="med"/>
+            <a:tailEnd type="arrow" w="med" len="med"/>
+          </a:ln>
+        </p:spPr>
+        <p:style>
+          <a:lnRef idx="1">
+            <a:schemeClr val="accent1"/>
+          </a:lnRef>
+          <a:fillRef idx="0">
+            <a:schemeClr val="accent1"/>
+          </a:fillRef>
+          <a:effectRef idx="0">
+            <a:schemeClr val="accent1"/>
+          </a:effectRef>
+          <a:fontRef idx="minor">
+            <a:schemeClr val="tx1"/>
+          </a:fontRef>
+        </p:style>
+      </p:cxnSp>
+      <p:cxnSp>
+        <p:nvCxnSpPr>
+          <p:cNvPr id="27" name="Forme 26"/>
+          <p:cNvCxnSpPr>
+            <a:stCxn id="6" idx="2"/>
+          </p:cNvCxnSpPr>
+          <p:nvPr/>
+        </p:nvCxnSpPr>
+        <p:spPr>
+          <a:xfrm rot="16200000" flipH="1">
+            <a:off x="2123728" y="3861048"/>
+            <a:ext cx="864096" cy="2160240"/>
+          </a:xfrm>
+          <a:prstGeom prst="curvedConnector2">
+            <a:avLst/>
+          </a:prstGeom>
+          <a:ln>
+            <a:headEnd type="arrow"/>
+            <a:tailEnd type="arrow"/>
+          </a:ln>
+        </p:spPr>
+        <p:style>
+          <a:lnRef idx="1">
+            <a:schemeClr val="accent1"/>
+          </a:lnRef>
+          <a:fillRef idx="0">
+            <a:schemeClr val="accent1"/>
+          </a:fillRef>
+          <a:effectRef idx="0">
+            <a:schemeClr val="accent1"/>
+          </a:effectRef>
+          <a:fontRef idx="minor">
+            <a:schemeClr val="tx1"/>
+          </a:fontRef>
+        </p:style>
+      </p:cxnSp>
+      <p:cxnSp>
+        <p:nvCxnSpPr>
+          <p:cNvPr id="30" name="Connecteur en arc 29"/>
+          <p:cNvCxnSpPr>
+            <a:endCxn id="5" idx="1"/>
+          </p:cNvCxnSpPr>
+          <p:nvPr/>
+        </p:nvCxnSpPr>
+        <p:spPr>
+          <a:xfrm flipV="1">
+            <a:off x="5652120" y="5193196"/>
+            <a:ext cx="720080" cy="252028"/>
+          </a:xfrm>
+          <a:prstGeom prst="curvedConnector3">
+            <a:avLst>
+              <a:gd name="adj1" fmla="val 50000"/>
+            </a:avLst>
+          </a:prstGeom>
+          <a:ln>
+            <a:headEnd type="arrow"/>
+            <a:tailEnd type="arrow"/>
+          </a:ln>
+        </p:spPr>
+        <p:style>
+          <a:lnRef idx="1">
+            <a:schemeClr val="accent1"/>
+          </a:lnRef>
+          <a:fillRef idx="0">
+            <a:schemeClr val="accent1"/>
+          </a:fillRef>
+          <a:effectRef idx="0">
+            <a:schemeClr val="accent1"/>
+          </a:effectRef>
+          <a:fontRef idx="minor">
+            <a:schemeClr val="tx1"/>
+          </a:fontRef>
+        </p:style>
+      </p:cxnSp>
     </p:spTree>
   </p:cSld>
   <p:clrMapOvr>
@@ -38228,7 +38664,7 @@
 </p:sld>
 </file>
 
-<file path=ppt/slides/slide23.xml><?xml version="1.0" encoding="utf-8"?>
+<file path=ppt/slides/slide24.xml><?xml version="1.0" encoding="utf-8"?>
 <p:sld xmlns:a="http://schemas.openxmlformats.org/drawingml/2006/main" xmlns:r="http://schemas.openxmlformats.org/officeDocument/2006/relationships" xmlns:p="http://schemas.openxmlformats.org/presentationml/2006/main">
   <p:cSld>
     <p:spTree>
@@ -38287,147 +38723,6 @@
           </a:p>
         </p:txBody>
       </p:sp>
-    </p:spTree>
-  </p:cSld>
-  <p:clrMapOvr>
-    <a:masterClrMapping/>
-  </p:clrMapOvr>
-</p:sld>
-</file>
-
-<file path=ppt/slides/slide24.xml><?xml version="1.0" encoding="utf-8"?>
-<p:sld xmlns:a="http://schemas.openxmlformats.org/drawingml/2006/main" xmlns:r="http://schemas.openxmlformats.org/officeDocument/2006/relationships" xmlns:p="http://schemas.openxmlformats.org/presentationml/2006/main">
-  <p:cSld>
-    <p:spTree>
-      <p:nvGrpSpPr>
-        <p:cNvPr id="1" name=""/>
-        <p:cNvGrpSpPr/>
-        <p:nvPr/>
-      </p:nvGrpSpPr>
-      <p:grpSpPr>
-        <a:xfrm>
-          <a:off x="0" y="0"/>
-          <a:ext cx="0" cy="0"/>
-          <a:chOff x="0" y="0"/>
-          <a:chExt cx="0" cy="0"/>
-        </a:xfrm>
-      </p:grpSpPr>
-      <p:sp>
-        <p:nvSpPr>
-          <p:cNvPr id="2" name="Titre 1"/>
-          <p:cNvSpPr>
-            <a:spLocks noGrp="1"/>
-          </p:cNvSpPr>
-          <p:nvPr>
-            <p:ph type="title"/>
-          </p:nvPr>
-        </p:nvSpPr>
-        <p:spPr/>
-        <p:txBody>
-          <a:bodyPr/>
-          <a:lstStyle/>
-          <a:p>
-            <a:r>
-              <a:rPr lang="fr-FR" dirty="0" smtClean="0"/>
-              <a:t>GUI – </a:t>
-            </a:r>
-            <a:r>
-              <a:rPr lang="fr-FR" dirty="0" err="1" smtClean="0"/>
-              <a:t>Core</a:t>
-            </a:r>
-            <a:r>
-              <a:rPr lang="fr-FR" dirty="0" smtClean="0"/>
-              <a:t> links</a:t>
-            </a:r>
-            <a:endParaRPr lang="fr-FR" dirty="0"/>
-          </a:p>
-        </p:txBody>
-      </p:sp>
-      <p:sp>
-        <p:nvSpPr>
-          <p:cNvPr id="3" name="Espace réservé du contenu 2"/>
-          <p:cNvSpPr>
-            <a:spLocks noGrp="1"/>
-          </p:cNvSpPr>
-          <p:nvPr>
-            <p:ph sz="half" idx="1"/>
-          </p:nvPr>
-        </p:nvSpPr>
-        <p:spPr/>
-        <p:txBody>
-          <a:bodyPr/>
-          <a:lstStyle/>
-          <a:p>
-            <a:r>
-              <a:rPr lang="fr-FR" dirty="0" err="1" smtClean="0"/>
-              <a:t>Often</a:t>
-            </a:r>
-            <a:r>
-              <a:rPr lang="fr-FR" dirty="0" smtClean="0"/>
-              <a:t> use </a:t>
-            </a:r>
-            <a:r>
-              <a:rPr lang="fr-FR" dirty="0" err="1" smtClean="0"/>
-              <a:t>Qt</a:t>
-            </a:r>
-            <a:r>
-              <a:rPr lang="fr-FR" dirty="0" smtClean="0"/>
-              <a:t> model-</a:t>
-            </a:r>
-            <a:r>
-              <a:rPr lang="fr-FR" dirty="0" err="1" smtClean="0"/>
-              <a:t>view</a:t>
-            </a:r>
-            <a:r>
-              <a:rPr lang="fr-FR" dirty="0" smtClean="0"/>
-              <a:t> </a:t>
-            </a:r>
-            <a:r>
-              <a:rPr lang="fr-FR" dirty="0" err="1" smtClean="0"/>
-              <a:t>programming</a:t>
-            </a:r>
-            <a:endParaRPr lang="fr-FR" dirty="0" smtClean="0"/>
-          </a:p>
-          <a:p>
-            <a:pPr lvl="1"/>
-            <a:r>
-              <a:rPr lang="fr-FR" dirty="0" smtClean="0"/>
-              <a:t>Data / GUI more </a:t>
-            </a:r>
-            <a:r>
-              <a:rPr lang="fr-FR" dirty="0" err="1" smtClean="0"/>
-              <a:t>independent</a:t>
-            </a:r>
-            <a:endParaRPr lang="fr-FR" dirty="0"/>
-          </a:p>
-        </p:txBody>
-      </p:sp>
-      <p:pic>
-        <p:nvPicPr>
-          <p:cNvPr id="1026" name="Picture 2" descr="http://developer.qt.nokia.com/doc/qt-4.8/images/modelview-overview.png"/>
-          <p:cNvPicPr>
-            <a:picLocks noChangeAspect="1" noChangeArrowheads="1"/>
-          </p:cNvPicPr>
-          <p:nvPr/>
-        </p:nvPicPr>
-        <p:blipFill>
-          <a:blip r:embed="rId2" cstate="print"/>
-          <a:srcRect/>
-          <a:stretch>
-            <a:fillRect/>
-          </a:stretch>
-        </p:blipFill>
-        <p:spPr bwMode="auto">
-          <a:xfrm>
-            <a:off x="5436096" y="1772816"/>
-            <a:ext cx="3347909" cy="3600054"/>
-          </a:xfrm>
-          <a:prstGeom prst="rect">
-            <a:avLst/>
-          </a:prstGeom>
-          <a:noFill/>
-        </p:spPr>
-      </p:pic>
     </p:spTree>
   </p:cSld>
   <p:clrMapOvr>
@@ -38470,6 +38765,147 @@
           <a:p>
             <a:r>
               <a:rPr lang="fr-FR" dirty="0" smtClean="0"/>
+              <a:t>GUI – </a:t>
+            </a:r>
+            <a:r>
+              <a:rPr lang="fr-FR" dirty="0" err="1" smtClean="0"/>
+              <a:t>Core</a:t>
+            </a:r>
+            <a:r>
+              <a:rPr lang="fr-FR" dirty="0" smtClean="0"/>
+              <a:t> links</a:t>
+            </a:r>
+            <a:endParaRPr lang="fr-FR" dirty="0"/>
+          </a:p>
+        </p:txBody>
+      </p:sp>
+      <p:sp>
+        <p:nvSpPr>
+          <p:cNvPr id="3" name="Espace réservé du contenu 2"/>
+          <p:cNvSpPr>
+            <a:spLocks noGrp="1"/>
+          </p:cNvSpPr>
+          <p:nvPr>
+            <p:ph sz="half" idx="1"/>
+          </p:nvPr>
+        </p:nvSpPr>
+        <p:spPr/>
+        <p:txBody>
+          <a:bodyPr/>
+          <a:lstStyle/>
+          <a:p>
+            <a:r>
+              <a:rPr lang="fr-FR" dirty="0" err="1" smtClean="0"/>
+              <a:t>Often</a:t>
+            </a:r>
+            <a:r>
+              <a:rPr lang="fr-FR" dirty="0" smtClean="0"/>
+              <a:t> use </a:t>
+            </a:r>
+            <a:r>
+              <a:rPr lang="fr-FR" dirty="0" err="1" smtClean="0"/>
+              <a:t>Qt</a:t>
+            </a:r>
+            <a:r>
+              <a:rPr lang="fr-FR" dirty="0" smtClean="0"/>
+              <a:t> model-</a:t>
+            </a:r>
+            <a:r>
+              <a:rPr lang="fr-FR" dirty="0" err="1" smtClean="0"/>
+              <a:t>view</a:t>
+            </a:r>
+            <a:r>
+              <a:rPr lang="fr-FR" dirty="0" smtClean="0"/>
+              <a:t> </a:t>
+            </a:r>
+            <a:r>
+              <a:rPr lang="fr-FR" dirty="0" err="1" smtClean="0"/>
+              <a:t>programming</a:t>
+            </a:r>
+            <a:endParaRPr lang="fr-FR" dirty="0" smtClean="0"/>
+          </a:p>
+          <a:p>
+            <a:pPr lvl="1"/>
+            <a:r>
+              <a:rPr lang="fr-FR" dirty="0" smtClean="0"/>
+              <a:t>Data / GUI more </a:t>
+            </a:r>
+            <a:r>
+              <a:rPr lang="fr-FR" dirty="0" err="1" smtClean="0"/>
+              <a:t>independent</a:t>
+            </a:r>
+            <a:endParaRPr lang="fr-FR" dirty="0"/>
+          </a:p>
+        </p:txBody>
+      </p:sp>
+      <p:pic>
+        <p:nvPicPr>
+          <p:cNvPr id="1026" name="Picture 2" descr="http://developer.qt.nokia.com/doc/qt-4.8/images/modelview-overview.png"/>
+          <p:cNvPicPr>
+            <a:picLocks noChangeAspect="1" noChangeArrowheads="1"/>
+          </p:cNvPicPr>
+          <p:nvPr/>
+        </p:nvPicPr>
+        <p:blipFill>
+          <a:blip r:embed="rId2" cstate="print"/>
+          <a:srcRect/>
+          <a:stretch>
+            <a:fillRect/>
+          </a:stretch>
+        </p:blipFill>
+        <p:spPr bwMode="auto">
+          <a:xfrm>
+            <a:off x="5436096" y="1772816"/>
+            <a:ext cx="3347909" cy="3600054"/>
+          </a:xfrm>
+          <a:prstGeom prst="rect">
+            <a:avLst/>
+          </a:prstGeom>
+          <a:noFill/>
+        </p:spPr>
+      </p:pic>
+    </p:spTree>
+  </p:cSld>
+  <p:clrMapOvr>
+    <a:masterClrMapping/>
+  </p:clrMapOvr>
+</p:sld>
+</file>
+
+<file path=ppt/slides/slide26.xml><?xml version="1.0" encoding="utf-8"?>
+<p:sld xmlns:a="http://schemas.openxmlformats.org/drawingml/2006/main" xmlns:r="http://schemas.openxmlformats.org/officeDocument/2006/relationships" xmlns:p="http://schemas.openxmlformats.org/presentationml/2006/main">
+  <p:cSld>
+    <p:spTree>
+      <p:nvGrpSpPr>
+        <p:cNvPr id="1" name=""/>
+        <p:cNvGrpSpPr/>
+        <p:nvPr/>
+      </p:nvGrpSpPr>
+      <p:grpSpPr>
+        <a:xfrm>
+          <a:off x="0" y="0"/>
+          <a:ext cx="0" cy="0"/>
+          <a:chOff x="0" y="0"/>
+          <a:chExt cx="0" cy="0"/>
+        </a:xfrm>
+      </p:grpSpPr>
+      <p:sp>
+        <p:nvSpPr>
+          <p:cNvPr id="2" name="Titre 1"/>
+          <p:cNvSpPr>
+            <a:spLocks noGrp="1"/>
+          </p:cNvSpPr>
+          <p:nvPr>
+            <p:ph type="title"/>
+          </p:nvPr>
+        </p:nvSpPr>
+        <p:spPr/>
+        <p:txBody>
+          <a:bodyPr/>
+          <a:lstStyle/>
+          <a:p>
+            <a:r>
+              <a:rPr lang="fr-FR" dirty="0" smtClean="0"/>
               <a:t>Conventions </a:t>
             </a:r>
             <a:r>
@@ -38695,6 +39131,143 @@
       </p:grpSpPr>
       <p:sp>
         <p:nvSpPr>
+          <p:cNvPr id="19458" name="Rectangle 2"/>
+          <p:cNvSpPr>
+            <a:spLocks noGrp="1"/>
+          </p:cNvSpPr>
+          <p:nvPr>
+            <p:ph type="title"/>
+          </p:nvPr>
+        </p:nvSpPr>
+        <p:spPr/>
+        <p:txBody>
+          <a:bodyPr/>
+          <a:lstStyle/>
+          <a:p>
+            <a:pPr algn="l"/>
+            <a:r>
+              <a:rPr lang="en-US" sz="2800" dirty="0" smtClean="0">
+                <a:latin typeface="Century Gothic"/>
+              </a:rPr>
+              <a:t>Subversion repository</a:t>
+            </a:r>
+            <a:endParaRPr lang="en-US" sz="2800" dirty="0">
+              <a:latin typeface="Century Gothic"/>
+            </a:endParaRPr>
+          </a:p>
+        </p:txBody>
+      </p:sp>
+      <p:sp>
+        <p:nvSpPr>
+          <p:cNvPr id="4" name="Espace réservé de la date 1"/>
+          <p:cNvSpPr>
+            <a:spLocks noGrp="1"/>
+          </p:cNvSpPr>
+          <p:nvPr>
+            <p:ph type="dt" sz="half" idx="10"/>
+          </p:nvPr>
+        </p:nvSpPr>
+        <p:spPr/>
+        <p:txBody>
+          <a:bodyPr/>
+          <a:lstStyle/>
+          <a:p>
+            <a:pPr>
+              <a:defRPr/>
+            </a:pPr>
+            <a:r>
+              <a:rPr lang="fr-FR"/>
+              <a:t>16/01/2012</a:t>
+            </a:r>
+          </a:p>
+        </p:txBody>
+      </p:sp>
+      <p:sp>
+        <p:nvSpPr>
+          <p:cNvPr id="5" name="Espace réservé du pied de page 2"/>
+          <p:cNvSpPr>
+            <a:spLocks noGrp="1"/>
+          </p:cNvSpPr>
+          <p:nvPr>
+            <p:ph type="ftr" sz="quarter" idx="12"/>
+          </p:nvPr>
+        </p:nvSpPr>
+        <p:spPr/>
+        <p:txBody>
+          <a:bodyPr/>
+          <a:lstStyle/>
+          <a:p>
+            <a:pPr>
+              <a:defRPr/>
+            </a:pPr>
+            <a:r>
+              <a:rPr lang="fr-FR"/>
+              <a:t>Plateforme CERES</a:t>
+            </a:r>
+            <a:endParaRPr lang="fr-FR" dirty="0"/>
+          </a:p>
+        </p:txBody>
+      </p:sp>
+      <p:pic>
+        <p:nvPicPr>
+          <p:cNvPr id="22530" name="Picture 2" descr="http://thevalerios.net/matt/wp-content/uploads/2008/11/image.png"/>
+          <p:cNvPicPr>
+            <a:picLocks noChangeAspect="1" noChangeArrowheads="1"/>
+          </p:cNvPicPr>
+          <p:nvPr/>
+        </p:nvPicPr>
+        <p:blipFill>
+          <a:blip r:embed="rId2" cstate="print"/>
+          <a:srcRect/>
+          <a:stretch>
+            <a:fillRect/>
+          </a:stretch>
+        </p:blipFill>
+        <p:spPr bwMode="auto">
+          <a:xfrm>
+            <a:off x="1331640" y="1700808"/>
+            <a:ext cx="6096000" cy="3276601"/>
+          </a:xfrm>
+          <a:prstGeom prst="rect">
+            <a:avLst/>
+          </a:prstGeom>
+          <a:noFill/>
+        </p:spPr>
+      </p:pic>
+    </p:spTree>
+  </p:cSld>
+  <p:clrMapOvr>
+    <a:masterClrMapping/>
+  </p:clrMapOvr>
+  <p:timing>
+    <p:tnLst>
+      <p:par>
+        <p:cTn id="1" dur="indefinite" restart="never" nodeType="tmRoot"/>
+      </p:par>
+    </p:tnLst>
+  </p:timing>
+</p:sld>
+</file>
+
+<file path=ppt/slides/slide4.xml><?xml version="1.0" encoding="utf-8"?>
+<p:sld xmlns:a="http://schemas.openxmlformats.org/drawingml/2006/main" xmlns:r="http://schemas.openxmlformats.org/officeDocument/2006/relationships" xmlns:p="http://schemas.openxmlformats.org/presentationml/2006/main">
+  <p:cSld>
+    <p:spTree>
+      <p:nvGrpSpPr>
+        <p:cNvPr id="1" name=""/>
+        <p:cNvGrpSpPr/>
+        <p:nvPr/>
+      </p:nvGrpSpPr>
+      <p:grpSpPr>
+        <a:xfrm>
+          <a:off x="0" y="0"/>
+          <a:ext cx="0" cy="0"/>
+          <a:chOff x="0" y="0"/>
+          <a:chExt cx="0" cy="0"/>
+        </a:xfrm>
+      </p:grpSpPr>
+      <p:sp>
+        <p:nvSpPr>
           <p:cNvPr id="4" name="Titre 3"/>
           <p:cNvSpPr>
             <a:spLocks noGrp="1"/>
@@ -38740,287 +39313,6 @@
   <p:clrMapOvr>
     <a:masterClrMapping/>
   </p:clrMapOvr>
-</p:sld>
-</file>
-
-<file path=ppt/slides/slide4.xml><?xml version="1.0" encoding="utf-8"?>
-<p:sld xmlns:a="http://schemas.openxmlformats.org/drawingml/2006/main" xmlns:r="http://schemas.openxmlformats.org/officeDocument/2006/relationships" xmlns:p="http://schemas.openxmlformats.org/presentationml/2006/main">
-  <p:cSld>
-    <p:spTree>
-      <p:nvGrpSpPr>
-        <p:cNvPr id="1" name=""/>
-        <p:cNvGrpSpPr/>
-        <p:nvPr/>
-      </p:nvGrpSpPr>
-      <p:grpSpPr>
-        <a:xfrm>
-          <a:off x="0" y="0"/>
-          <a:ext cx="0" cy="0"/>
-          <a:chOff x="0" y="0"/>
-          <a:chExt cx="0" cy="0"/>
-        </a:xfrm>
-      </p:grpSpPr>
-      <p:sp>
-        <p:nvSpPr>
-          <p:cNvPr id="2" name="Titre 1"/>
-          <p:cNvSpPr>
-            <a:spLocks noGrp="1"/>
-          </p:cNvSpPr>
-          <p:nvPr>
-            <p:ph type="title"/>
-          </p:nvPr>
-        </p:nvSpPr>
-        <p:spPr/>
-        <p:txBody>
-          <a:bodyPr/>
-          <a:lstStyle/>
-          <a:p>
-            <a:r>
-              <a:rPr lang="fr-FR" dirty="0" smtClean="0"/>
-              <a:t>Class </a:t>
-            </a:r>
-            <a:r>
-              <a:rPr lang="fr-FR" dirty="0" smtClean="0">
-                <a:hlinkClick r:id="rId2" action="ppaction://hlinkfile"/>
-              </a:rPr>
-              <a:t>Project</a:t>
-            </a:r>
-            <a:endParaRPr lang="fr-FR" dirty="0"/>
-          </a:p>
-        </p:txBody>
-      </p:sp>
-      <p:sp>
-        <p:nvSpPr>
-          <p:cNvPr id="3" name="Espace réservé du contenu 2"/>
-          <p:cNvSpPr>
-            <a:spLocks noGrp="1"/>
-          </p:cNvSpPr>
-          <p:nvPr>
-            <p:ph idx="1"/>
-          </p:nvPr>
-        </p:nvSpPr>
-        <p:spPr/>
-        <p:txBody>
-          <a:bodyPr>
-            <a:normAutofit fontScale="92500" lnSpcReduction="20000"/>
-          </a:bodyPr>
-          <a:lstStyle/>
-          <a:p>
-            <a:r>
-              <a:rPr lang="fr-FR" b="1" dirty="0" smtClean="0"/>
-              <a:t>The </a:t>
-            </a:r>
-            <a:r>
-              <a:rPr lang="fr-FR" b="1" dirty="0" err="1" smtClean="0"/>
-              <a:t>Core</a:t>
-            </a:r>
-            <a:r>
-              <a:rPr lang="fr-FR" b="1" dirty="0" smtClean="0"/>
-              <a:t> of the program</a:t>
-            </a:r>
-          </a:p>
-          <a:p>
-            <a:r>
-              <a:rPr lang="fr-FR" dirty="0" smtClean="0"/>
-              <a:t>One </a:t>
-            </a:r>
-            <a:r>
-              <a:rPr lang="fr-FR" dirty="0" err="1" smtClean="0"/>
-              <a:t>project</a:t>
-            </a:r>
-            <a:r>
-              <a:rPr lang="fr-FR" dirty="0" smtClean="0"/>
-              <a:t> </a:t>
-            </a:r>
-            <a:r>
-              <a:rPr lang="fr-FR" dirty="0" err="1" smtClean="0"/>
-              <a:t>at</a:t>
-            </a:r>
-            <a:r>
-              <a:rPr lang="fr-FR" dirty="0" smtClean="0"/>
-              <a:t> a time</a:t>
-            </a:r>
-          </a:p>
-          <a:p>
-            <a:r>
-              <a:rPr lang="fr-FR" dirty="0" err="1" smtClean="0"/>
-              <a:t>Contains</a:t>
-            </a:r>
-            <a:r>
-              <a:rPr lang="fr-FR" dirty="0" smtClean="0"/>
-              <a:t> main items</a:t>
-            </a:r>
-          </a:p>
-          <a:p>
-            <a:pPr lvl="1"/>
-            <a:r>
-              <a:rPr lang="fr-FR" dirty="0" err="1" smtClean="0"/>
-              <a:t>Modelica</a:t>
-            </a:r>
-            <a:r>
-              <a:rPr lang="fr-FR" dirty="0" smtClean="0"/>
-              <a:t> </a:t>
-            </a:r>
-            <a:r>
-              <a:rPr lang="fr-FR" dirty="0" err="1" smtClean="0"/>
-              <a:t>tree</a:t>
-            </a:r>
-            <a:r>
-              <a:rPr lang="fr-FR" dirty="0" smtClean="0"/>
-              <a:t> of </a:t>
-            </a:r>
-            <a:r>
-              <a:rPr lang="fr-FR" dirty="0" err="1" smtClean="0"/>
-              <a:t>models</a:t>
-            </a:r>
-            <a:r>
-              <a:rPr lang="fr-FR" dirty="0" smtClean="0"/>
-              <a:t>, package… (</a:t>
-            </a:r>
-            <a:r>
-              <a:rPr lang="fr-FR" dirty="0" err="1" smtClean="0"/>
-              <a:t>ModClassTree</a:t>
-            </a:r>
-            <a:r>
-              <a:rPr lang="fr-FR" dirty="0" smtClean="0"/>
-              <a:t>)</a:t>
-            </a:r>
-          </a:p>
-          <a:p>
-            <a:pPr lvl="1"/>
-            <a:r>
-              <a:rPr lang="fr-FR" dirty="0" smtClean="0"/>
-              <a:t>List of </a:t>
-            </a:r>
-            <a:r>
-              <a:rPr lang="fr-FR" dirty="0" err="1" smtClean="0"/>
-              <a:t>problems</a:t>
-            </a:r>
-            <a:r>
-              <a:rPr lang="fr-FR" dirty="0" smtClean="0"/>
-              <a:t> and </a:t>
-            </a:r>
-            <a:r>
-              <a:rPr lang="fr-FR" dirty="0" err="1" smtClean="0"/>
-              <a:t>results</a:t>
-            </a:r>
-            <a:endParaRPr lang="fr-FR" dirty="0" smtClean="0"/>
-          </a:p>
-          <a:p>
-            <a:pPr lvl="1"/>
-            <a:r>
-              <a:rPr lang="fr-FR" dirty="0" smtClean="0"/>
-              <a:t>List of </a:t>
-            </a:r>
-            <a:r>
-              <a:rPr lang="fr-FR" dirty="0" err="1" smtClean="0"/>
-              <a:t>ModModelPlus</a:t>
-            </a:r>
-            <a:endParaRPr lang="fr-FR" dirty="0" smtClean="0"/>
-          </a:p>
-          <a:p>
-            <a:pPr lvl="1"/>
-            <a:r>
-              <a:rPr lang="fr-FR" dirty="0" err="1" smtClean="0"/>
-              <a:t>Misc</a:t>
-            </a:r>
-            <a:r>
-              <a:rPr lang="fr-FR" dirty="0" smtClean="0"/>
-              <a:t>. Informations : </a:t>
-            </a:r>
-            <a:r>
-              <a:rPr lang="fr-FR" dirty="0" err="1" smtClean="0"/>
-              <a:t>save</a:t>
-            </a:r>
-            <a:r>
-              <a:rPr lang="fr-FR" dirty="0" smtClean="0"/>
-              <a:t> files, files </a:t>
-            </a:r>
-            <a:r>
-              <a:rPr lang="fr-FR" dirty="0" err="1" smtClean="0"/>
-              <a:t>loaded</a:t>
-            </a:r>
-            <a:endParaRPr lang="fr-FR" dirty="0" smtClean="0"/>
-          </a:p>
-          <a:p>
-            <a:r>
-              <a:rPr lang="fr-FR" dirty="0" smtClean="0"/>
-              <a:t>Main </a:t>
-            </a:r>
-            <a:r>
-              <a:rPr lang="fr-FR" dirty="0" err="1" smtClean="0"/>
-              <a:t>functions</a:t>
-            </a:r>
-            <a:endParaRPr lang="fr-FR" dirty="0" smtClean="0"/>
-          </a:p>
-          <a:p>
-            <a:pPr lvl="1"/>
-            <a:r>
-              <a:rPr lang="fr-FR" dirty="0" err="1" smtClean="0"/>
-              <a:t>Problems</a:t>
-            </a:r>
-            <a:r>
-              <a:rPr lang="fr-FR" dirty="0" smtClean="0"/>
-              <a:t> </a:t>
-            </a:r>
-            <a:r>
-              <a:rPr lang="fr-FR" dirty="0" err="1" smtClean="0"/>
-              <a:t>should</a:t>
-            </a:r>
-            <a:r>
-              <a:rPr lang="fr-FR" dirty="0" smtClean="0"/>
-              <a:t> </a:t>
-            </a:r>
-            <a:r>
-              <a:rPr lang="fr-FR" dirty="0" err="1" smtClean="0"/>
-              <a:t>be</a:t>
-            </a:r>
-            <a:r>
-              <a:rPr lang="fr-FR" dirty="0" smtClean="0"/>
-              <a:t> </a:t>
-            </a:r>
-            <a:r>
-              <a:rPr lang="fr-FR" dirty="0" err="1" smtClean="0"/>
-              <a:t>launched</a:t>
-            </a:r>
-            <a:r>
-              <a:rPr lang="fr-FR" dirty="0" smtClean="0"/>
-              <a:t> </a:t>
-            </a:r>
-            <a:r>
-              <a:rPr lang="fr-FR" dirty="0" err="1" smtClean="0"/>
-              <a:t>from</a:t>
-            </a:r>
-            <a:r>
-              <a:rPr lang="fr-FR" dirty="0" smtClean="0"/>
-              <a:t> Project</a:t>
-            </a:r>
-          </a:p>
-          <a:p>
-            <a:pPr lvl="1"/>
-            <a:r>
-              <a:rPr lang="fr-FR" dirty="0" smtClean="0"/>
-              <a:t>Threads management</a:t>
-            </a:r>
-          </a:p>
-          <a:p>
-            <a:pPr lvl="1"/>
-            <a:endParaRPr lang="fr-FR" dirty="0"/>
-          </a:p>
-        </p:txBody>
-      </p:sp>
-    </p:spTree>
-  </p:cSld>
-  <p:clrMapOvr>
-    <a:masterClrMapping/>
-  </p:clrMapOvr>
-  <p:timing>
-    <p:tnLst>
-      <p:par>
-        <p:cTn id="1" dur="indefinite" restart="never" nodeType="tmRoot"/>
-      </p:par>
-    </p:tnLst>
-  </p:timing>
 </p:sld>
 </file>
 
@@ -39070,6 +39362,287 @@
           </a:p>
         </p:txBody>
       </p:sp>
+      <p:sp>
+        <p:nvSpPr>
+          <p:cNvPr id="3" name="Espace réservé du contenu 2"/>
+          <p:cNvSpPr>
+            <a:spLocks noGrp="1"/>
+          </p:cNvSpPr>
+          <p:nvPr>
+            <p:ph idx="1"/>
+          </p:nvPr>
+        </p:nvSpPr>
+        <p:spPr/>
+        <p:txBody>
+          <a:bodyPr>
+            <a:normAutofit fontScale="92500" lnSpcReduction="20000"/>
+          </a:bodyPr>
+          <a:lstStyle/>
+          <a:p>
+            <a:r>
+              <a:rPr lang="fr-FR" b="1" dirty="0" smtClean="0"/>
+              <a:t>The </a:t>
+            </a:r>
+            <a:r>
+              <a:rPr lang="fr-FR" b="1" dirty="0" err="1" smtClean="0"/>
+              <a:t>Core</a:t>
+            </a:r>
+            <a:r>
+              <a:rPr lang="fr-FR" b="1" dirty="0" smtClean="0"/>
+              <a:t> of the program</a:t>
+            </a:r>
+          </a:p>
+          <a:p>
+            <a:r>
+              <a:rPr lang="fr-FR" dirty="0" smtClean="0"/>
+              <a:t>One </a:t>
+            </a:r>
+            <a:r>
+              <a:rPr lang="fr-FR" dirty="0" err="1" smtClean="0"/>
+              <a:t>project</a:t>
+            </a:r>
+            <a:r>
+              <a:rPr lang="fr-FR" dirty="0" smtClean="0"/>
+              <a:t> </a:t>
+            </a:r>
+            <a:r>
+              <a:rPr lang="fr-FR" dirty="0" err="1" smtClean="0"/>
+              <a:t>at</a:t>
+            </a:r>
+            <a:r>
+              <a:rPr lang="fr-FR" dirty="0" smtClean="0"/>
+              <a:t> a time</a:t>
+            </a:r>
+          </a:p>
+          <a:p>
+            <a:r>
+              <a:rPr lang="fr-FR" dirty="0" err="1" smtClean="0"/>
+              <a:t>Contains</a:t>
+            </a:r>
+            <a:r>
+              <a:rPr lang="fr-FR" dirty="0" smtClean="0"/>
+              <a:t> main items</a:t>
+            </a:r>
+          </a:p>
+          <a:p>
+            <a:pPr lvl="1"/>
+            <a:r>
+              <a:rPr lang="fr-FR" dirty="0" err="1" smtClean="0"/>
+              <a:t>Modelica</a:t>
+            </a:r>
+            <a:r>
+              <a:rPr lang="fr-FR" dirty="0" smtClean="0"/>
+              <a:t> </a:t>
+            </a:r>
+            <a:r>
+              <a:rPr lang="fr-FR" dirty="0" err="1" smtClean="0"/>
+              <a:t>tree</a:t>
+            </a:r>
+            <a:r>
+              <a:rPr lang="fr-FR" dirty="0" smtClean="0"/>
+              <a:t> of </a:t>
+            </a:r>
+            <a:r>
+              <a:rPr lang="fr-FR" dirty="0" err="1" smtClean="0"/>
+              <a:t>models</a:t>
+            </a:r>
+            <a:r>
+              <a:rPr lang="fr-FR" dirty="0" smtClean="0"/>
+              <a:t>, package… (</a:t>
+            </a:r>
+            <a:r>
+              <a:rPr lang="fr-FR" dirty="0" err="1" smtClean="0"/>
+              <a:t>ModClassTree</a:t>
+            </a:r>
+            <a:r>
+              <a:rPr lang="fr-FR" dirty="0" smtClean="0"/>
+              <a:t>)</a:t>
+            </a:r>
+          </a:p>
+          <a:p>
+            <a:pPr lvl="1"/>
+            <a:r>
+              <a:rPr lang="fr-FR" dirty="0" smtClean="0"/>
+              <a:t>List of </a:t>
+            </a:r>
+            <a:r>
+              <a:rPr lang="fr-FR" dirty="0" err="1" smtClean="0"/>
+              <a:t>problems</a:t>
+            </a:r>
+            <a:r>
+              <a:rPr lang="fr-FR" dirty="0" smtClean="0"/>
+              <a:t> and </a:t>
+            </a:r>
+            <a:r>
+              <a:rPr lang="fr-FR" dirty="0" err="1" smtClean="0"/>
+              <a:t>results</a:t>
+            </a:r>
+            <a:endParaRPr lang="fr-FR" dirty="0" smtClean="0"/>
+          </a:p>
+          <a:p>
+            <a:pPr lvl="1"/>
+            <a:r>
+              <a:rPr lang="fr-FR" dirty="0" smtClean="0"/>
+              <a:t>List of </a:t>
+            </a:r>
+            <a:r>
+              <a:rPr lang="fr-FR" dirty="0" err="1" smtClean="0"/>
+              <a:t>ModModelPlus</a:t>
+            </a:r>
+            <a:endParaRPr lang="fr-FR" dirty="0" smtClean="0"/>
+          </a:p>
+          <a:p>
+            <a:pPr lvl="1"/>
+            <a:r>
+              <a:rPr lang="fr-FR" dirty="0" err="1" smtClean="0"/>
+              <a:t>Misc</a:t>
+            </a:r>
+            <a:r>
+              <a:rPr lang="fr-FR" dirty="0" smtClean="0"/>
+              <a:t>. Informations : </a:t>
+            </a:r>
+            <a:r>
+              <a:rPr lang="fr-FR" dirty="0" err="1" smtClean="0"/>
+              <a:t>save</a:t>
+            </a:r>
+            <a:r>
+              <a:rPr lang="fr-FR" dirty="0" smtClean="0"/>
+              <a:t> files, files </a:t>
+            </a:r>
+            <a:r>
+              <a:rPr lang="fr-FR" dirty="0" err="1" smtClean="0"/>
+              <a:t>loaded</a:t>
+            </a:r>
+            <a:endParaRPr lang="fr-FR" dirty="0" smtClean="0"/>
+          </a:p>
+          <a:p>
+            <a:r>
+              <a:rPr lang="fr-FR" dirty="0" smtClean="0"/>
+              <a:t>Main </a:t>
+            </a:r>
+            <a:r>
+              <a:rPr lang="fr-FR" dirty="0" err="1" smtClean="0"/>
+              <a:t>functions</a:t>
+            </a:r>
+            <a:endParaRPr lang="fr-FR" dirty="0" smtClean="0"/>
+          </a:p>
+          <a:p>
+            <a:pPr lvl="1"/>
+            <a:r>
+              <a:rPr lang="fr-FR" dirty="0" err="1" smtClean="0"/>
+              <a:t>Problems</a:t>
+            </a:r>
+            <a:r>
+              <a:rPr lang="fr-FR" dirty="0" smtClean="0"/>
+              <a:t> </a:t>
+            </a:r>
+            <a:r>
+              <a:rPr lang="fr-FR" dirty="0" err="1" smtClean="0"/>
+              <a:t>should</a:t>
+            </a:r>
+            <a:r>
+              <a:rPr lang="fr-FR" dirty="0" smtClean="0"/>
+              <a:t> </a:t>
+            </a:r>
+            <a:r>
+              <a:rPr lang="fr-FR" dirty="0" err="1" smtClean="0"/>
+              <a:t>be</a:t>
+            </a:r>
+            <a:r>
+              <a:rPr lang="fr-FR" dirty="0" smtClean="0"/>
+              <a:t> </a:t>
+            </a:r>
+            <a:r>
+              <a:rPr lang="fr-FR" dirty="0" err="1" smtClean="0"/>
+              <a:t>launched</a:t>
+            </a:r>
+            <a:r>
+              <a:rPr lang="fr-FR" dirty="0" smtClean="0"/>
+              <a:t> </a:t>
+            </a:r>
+            <a:r>
+              <a:rPr lang="fr-FR" dirty="0" err="1" smtClean="0"/>
+              <a:t>from</a:t>
+            </a:r>
+            <a:r>
+              <a:rPr lang="fr-FR" dirty="0" smtClean="0"/>
+              <a:t> Project</a:t>
+            </a:r>
+          </a:p>
+          <a:p>
+            <a:pPr lvl="1"/>
+            <a:r>
+              <a:rPr lang="fr-FR" dirty="0" smtClean="0"/>
+              <a:t>Threads management</a:t>
+            </a:r>
+          </a:p>
+          <a:p>
+            <a:pPr lvl="1"/>
+            <a:endParaRPr lang="fr-FR" dirty="0"/>
+          </a:p>
+        </p:txBody>
+      </p:sp>
+    </p:spTree>
+  </p:cSld>
+  <p:clrMapOvr>
+    <a:masterClrMapping/>
+  </p:clrMapOvr>
+  <p:timing>
+    <p:tnLst>
+      <p:par>
+        <p:cTn id="1" dur="indefinite" restart="never" nodeType="tmRoot"/>
+      </p:par>
+    </p:tnLst>
+  </p:timing>
+</p:sld>
+</file>
+
+<file path=ppt/slides/slide6.xml><?xml version="1.0" encoding="utf-8"?>
+<p:sld xmlns:a="http://schemas.openxmlformats.org/drawingml/2006/main" xmlns:r="http://schemas.openxmlformats.org/officeDocument/2006/relationships" xmlns:p="http://schemas.openxmlformats.org/presentationml/2006/main">
+  <p:cSld>
+    <p:spTree>
+      <p:nvGrpSpPr>
+        <p:cNvPr id="1" name=""/>
+        <p:cNvGrpSpPr/>
+        <p:nvPr/>
+      </p:nvGrpSpPr>
+      <p:grpSpPr>
+        <a:xfrm>
+          <a:off x="0" y="0"/>
+          <a:ext cx="0" cy="0"/>
+          <a:chOff x="0" y="0"/>
+          <a:chExt cx="0" cy="0"/>
+        </a:xfrm>
+      </p:grpSpPr>
+      <p:sp>
+        <p:nvSpPr>
+          <p:cNvPr id="2" name="Titre 1"/>
+          <p:cNvSpPr>
+            <a:spLocks noGrp="1"/>
+          </p:cNvSpPr>
+          <p:nvPr>
+            <p:ph type="title"/>
+          </p:nvPr>
+        </p:nvSpPr>
+        <p:spPr/>
+        <p:txBody>
+          <a:bodyPr/>
+          <a:lstStyle/>
+          <a:p>
+            <a:r>
+              <a:rPr lang="fr-FR" dirty="0" smtClean="0"/>
+              <a:t>Class </a:t>
+            </a:r>
+            <a:r>
+              <a:rPr lang="fr-FR" dirty="0" smtClean="0">
+                <a:hlinkClick r:id="rId2" action="ppaction://hlinkfile"/>
+              </a:rPr>
+              <a:t>Project</a:t>
+            </a:r>
+            <a:endParaRPr lang="fr-FR" dirty="0"/>
+          </a:p>
+        </p:txBody>
+      </p:sp>
       <p:pic>
         <p:nvPicPr>
           <p:cNvPr id="4" name="Espace réservé du contenu 3" descr="Project.png"/>
@@ -39101,7 +39674,7 @@
 </p:sld>
 </file>
 
-<file path=ppt/slides/slide6.xml><?xml version="1.0" encoding="utf-8"?>
+<file path=ppt/slides/slide7.xml><?xml version="1.0" encoding="utf-8"?>
 <p:sld xmlns:a="http://schemas.openxmlformats.org/drawingml/2006/main" xmlns:r="http://schemas.openxmlformats.org/officeDocument/2006/relationships" xmlns:p="http://schemas.openxmlformats.org/presentationml/2006/main">
   <p:cSld>
     <p:spTree>
@@ -39157,6 +39730,36 @@
           </a:graphicData>
         </a:graphic>
       </p:graphicFrame>
+      <p:sp>
+        <p:nvSpPr>
+          <p:cNvPr id="5" name="ZoneTexte 4"/>
+          <p:cNvSpPr txBox="1"/>
+          <p:nvPr/>
+        </p:nvSpPr>
+        <p:spPr>
+          <a:xfrm>
+            <a:off x="1907704" y="4149080"/>
+            <a:ext cx="1121397" cy="369332"/>
+          </a:xfrm>
+          <a:prstGeom prst="rect">
+            <a:avLst/>
+          </a:prstGeom>
+          <a:noFill/>
+        </p:spPr>
+        <p:txBody>
+          <a:bodyPr wrap="none" rtlCol="0">
+            <a:spAutoFit/>
+          </a:bodyPr>
+          <a:lstStyle/>
+          <a:p>
+            <a:r>
+              <a:rPr lang="fr-FR" dirty="0" err="1" smtClean="0"/>
+              <a:t>OMOptim</a:t>
+            </a:r>
+            <a:endParaRPr lang="fr-FR" dirty="0"/>
+          </a:p>
+        </p:txBody>
+      </p:sp>
     </p:spTree>
   </p:cSld>
   <p:clrMapOvr>
@@ -39165,7 +39768,7 @@
 </p:sld>
 </file>
 
-<file path=ppt/slides/slide7.xml><?xml version="1.0" encoding="utf-8"?>
+<file path=ppt/slides/slide8.xml><?xml version="1.0" encoding="utf-8"?>
 <p:sld xmlns:a="http://schemas.openxmlformats.org/drawingml/2006/main" xmlns:r="http://schemas.openxmlformats.org/officeDocument/2006/relationships" xmlns:p="http://schemas.openxmlformats.org/presentationml/2006/main">
   <p:cSld>
     <p:spTree>
@@ -39240,7 +39843,7 @@
 </p:sld>
 </file>
 
-<file path=ppt/slides/slide8.xml><?xml version="1.0" encoding="utf-8"?>
+<file path=ppt/slides/slide9.xml><?xml version="1.0" encoding="utf-8"?>
 <p:sld xmlns:a="http://schemas.openxmlformats.org/drawingml/2006/main" xmlns:r="http://schemas.openxmlformats.org/officeDocument/2006/relationships" xmlns:p="http://schemas.openxmlformats.org/presentationml/2006/main">
   <p:cSld>
     <p:spTree>
@@ -39402,122 +40005,6 @@
               <a:t>diagram</a:t>
             </a:r>
             <a:endParaRPr lang="fr-FR" sz="1400" dirty="0"/>
-          </a:p>
-        </p:txBody>
-      </p:sp>
-    </p:spTree>
-  </p:cSld>
-  <p:clrMapOvr>
-    <a:masterClrMapping/>
-  </p:clrMapOvr>
-</p:sld>
-</file>
-
-<file path=ppt/slides/slide9.xml><?xml version="1.0" encoding="utf-8"?>
-<p:sld xmlns:a="http://schemas.openxmlformats.org/drawingml/2006/main" xmlns:r="http://schemas.openxmlformats.org/officeDocument/2006/relationships" xmlns:p="http://schemas.openxmlformats.org/presentationml/2006/main">
-  <p:cSld>
-    <p:spTree>
-      <p:nvGrpSpPr>
-        <p:cNvPr id="1" name=""/>
-        <p:cNvGrpSpPr/>
-        <p:nvPr/>
-      </p:nvGrpSpPr>
-      <p:grpSpPr>
-        <a:xfrm>
-          <a:off x="0" y="0"/>
-          <a:ext cx="0" cy="0"/>
-          <a:chOff x="0" y="0"/>
-          <a:chExt cx="0" cy="0"/>
-        </a:xfrm>
-      </p:grpSpPr>
-      <p:sp>
-        <p:nvSpPr>
-          <p:cNvPr id="2" name="Titre 1"/>
-          <p:cNvSpPr>
-            <a:spLocks noGrp="1"/>
-          </p:cNvSpPr>
-          <p:nvPr>
-            <p:ph type="title"/>
-          </p:nvPr>
-        </p:nvSpPr>
-        <p:spPr/>
-        <p:txBody>
-          <a:bodyPr/>
-          <a:lstStyle/>
-          <a:p>
-            <a:r>
-              <a:rPr lang="fr-FR" dirty="0" err="1" smtClean="0">
-                <a:hlinkClick r:id="rId2" action="ppaction://hlinkfile"/>
-              </a:rPr>
-              <a:t>ModClassTree</a:t>
-            </a:r>
-            <a:endParaRPr lang="fr-FR" dirty="0"/>
-          </a:p>
-        </p:txBody>
-      </p:sp>
-      <p:sp>
-        <p:nvSpPr>
-          <p:cNvPr id="4" name="Espace réservé du contenu 3"/>
-          <p:cNvSpPr>
-            <a:spLocks noGrp="1"/>
-          </p:cNvSpPr>
-          <p:nvPr>
-            <p:ph sz="half" idx="1"/>
-          </p:nvPr>
-        </p:nvSpPr>
-        <p:spPr/>
-        <p:txBody>
-          <a:bodyPr/>
-          <a:lstStyle/>
-          <a:p>
-            <a:r>
-              <a:rPr lang="fr-FR" dirty="0" err="1" smtClean="0"/>
-              <a:t>Contains</a:t>
-            </a:r>
-            <a:r>
-              <a:rPr lang="fr-FR" dirty="0" smtClean="0"/>
-              <a:t> </a:t>
-            </a:r>
-            <a:r>
-              <a:rPr lang="fr-FR" dirty="0" err="1" smtClean="0"/>
-              <a:t>modelica</a:t>
-            </a:r>
-            <a:r>
-              <a:rPr lang="fr-FR" dirty="0" smtClean="0"/>
-              <a:t> </a:t>
-            </a:r>
-            <a:r>
-              <a:rPr lang="fr-FR" dirty="0" err="1" smtClean="0"/>
-              <a:t>models</a:t>
-            </a:r>
-            <a:r>
-              <a:rPr lang="fr-FR" dirty="0" smtClean="0"/>
-              <a:t>, packages, classes </a:t>
-            </a:r>
-            <a:r>
-              <a:rPr lang="fr-FR" dirty="0" err="1" smtClean="0"/>
-              <a:t>names</a:t>
-            </a:r>
-            <a:endParaRPr lang="fr-FR" dirty="0" smtClean="0"/>
-          </a:p>
-        </p:txBody>
-      </p:sp>
-      <p:sp>
-        <p:nvSpPr>
-          <p:cNvPr id="5" name="Espace réservé du contenu 4"/>
-          <p:cNvSpPr>
-            <a:spLocks noGrp="1"/>
-          </p:cNvSpPr>
-          <p:nvPr>
-            <p:ph sz="half" idx="2"/>
-          </p:nvPr>
-        </p:nvSpPr>
-        <p:spPr/>
-        <p:txBody>
-          <a:bodyPr/>
-          <a:lstStyle/>
-          <a:p>
-            <a:endParaRPr lang="fr-FR"/>
           </a:p>
         </p:txBody>
       </p:sp>

</xml_diff>

<commit_message>
- Splitted OMOptim : there is now a lib called OMOptimBasis (within OMOptim folder) which provides basis features. It will allow to share code with plugins and to build dedicated applications using similar base classes.
git-svn-id: https://openmodelica.org/svn/OpenModelica/trunk@11231 f25d12d1-65f4-0310-ae8a-bbce733d8d8e
</commit_message>
<xml_diff>
--- a/OMOptim/Doc/HowProblemWorks.pptx
+++ b/OMOptim/Doc/HowProblemWorks.pptx
@@ -31,6 +31,9 @@
     <p:sldId id="273" r:id="rId25"/>
     <p:sldId id="267" r:id="rId26"/>
     <p:sldId id="262" r:id="rId27"/>
+    <p:sldId id="282" r:id="rId28"/>
+    <p:sldId id="283" r:id="rId29"/>
+    <p:sldId id="284" r:id="rId30"/>
   </p:sldIdLst>
   <p:sldSz cx="9144000" cy="6858000" type="screen4x3"/>
   <p:notesSz cx="6858000" cy="9144000"/>
@@ -9085,8 +9088,8 @@
     <dgm:cxn modelId="{48D22040-CF27-448C-BDBA-2A058B043E2D}" srcId="{0B3F7744-8F29-4622-8D49-8C60D1C05890}" destId="{828F7B55-32CA-4297-A0E4-F02A8C986122}" srcOrd="0" destOrd="0" parTransId="{2EA57F0D-7D94-4528-9C74-4BFB9F107881}" sibTransId="{FCAED9A0-5174-4962-9C55-05A3D4A15FE4}"/>
     <dgm:cxn modelId="{7D973084-D08D-48F7-B0D0-4BFA30C2A0F7}" srcId="{5F44AF28-2EA2-4CDA-8D13-1042B361AC47}" destId="{07FB65A4-5703-49B3-9CCB-6E9DC14F3325}" srcOrd="1" destOrd="0" parTransId="{C75B37C3-59DA-43DC-9086-69F6D896F3F4}" sibTransId="{989E8FBE-86B8-47D3-AE39-A15C4F4D0121}"/>
     <dgm:cxn modelId="{36EC5087-60EF-4C02-A9F6-A953FD5463E1}" srcId="{F17851F1-EB37-45C1-81F0-D886824D6417}" destId="{644E039F-0CE2-4F84-900E-A930E0A79599}" srcOrd="2" destOrd="0" parTransId="{BFFDFC34-7932-467F-A5CC-03A0905071A9}" sibTransId="{9A790E47-869B-4803-80BD-7EC3316B6B6B}"/>
+    <dgm:cxn modelId="{FA80D8BA-E3FB-4C08-85B1-72BA8FCDD4C9}" type="presOf" srcId="{5F44AF28-2EA2-4CDA-8D13-1042B361AC47}" destId="{BFF08F80-209A-4488-9CBB-F39D4D3AD10D}" srcOrd="0" destOrd="0" presId="urn:microsoft.com/office/officeart/2005/8/layout/radial2"/>
     <dgm:cxn modelId="{4A66E1DF-9D22-412E-A18A-D7D634CA8DC0}" type="presOf" srcId="{6DAF789B-265A-4641-927F-0B09B8CF8206}" destId="{0D5D4495-4913-4557-B891-5019864EB310}" srcOrd="0" destOrd="1" presId="urn:microsoft.com/office/officeart/2005/8/layout/radial2"/>
-    <dgm:cxn modelId="{FA80D8BA-E3FB-4C08-85B1-72BA8FCDD4C9}" type="presOf" srcId="{5F44AF28-2EA2-4CDA-8D13-1042B361AC47}" destId="{BFF08F80-209A-4488-9CBB-F39D4D3AD10D}" srcOrd="0" destOrd="0" presId="urn:microsoft.com/office/officeart/2005/8/layout/radial2"/>
     <dgm:cxn modelId="{C2F1770C-080F-455E-8143-465304B9E8CB}" type="presOf" srcId="{C75B37C3-59DA-43DC-9086-69F6D896F3F4}" destId="{1CAC1A4C-A982-41F2-84B5-BD79D61052FC}" srcOrd="0" destOrd="0" presId="urn:microsoft.com/office/officeart/2005/8/layout/radial2"/>
     <dgm:cxn modelId="{019518D7-A248-4B3D-B8DF-411510EE31A9}" type="presOf" srcId="{6EADFD6B-F6E5-4BF4-842E-D35E0A9DD23B}" destId="{FAD82DA5-3E64-4280-B56A-2017715C5ACB}" srcOrd="0" destOrd="3" presId="urn:microsoft.com/office/officeart/2005/8/layout/radial2"/>
     <dgm:cxn modelId="{2D03E44A-49DB-4706-8AEC-7527455FC14A}" srcId="{07FB65A4-5703-49B3-9CCB-6E9DC14F3325}" destId="{58685008-E223-4AD0-8B71-A71211216574}" srcOrd="0" destOrd="0" parTransId="{917BE320-7403-43A0-B2D2-53D970E07D5B}" sibTransId="{57729E23-573D-4E8E-B3E5-1786BC6D29D3}"/>
@@ -9702,8 +9705,8 @@
     <dgm:cxn modelId="{96A18D2B-9A33-4199-8A69-B7BDB680B6D5}" type="presOf" srcId="{BB0E69BC-A4D3-40BA-B837-7DDB8D6439D6}" destId="{7C78537B-53EB-4A93-A1F3-E0953DE7FA71}" srcOrd="0" destOrd="0" presId="urn:microsoft.com/office/officeart/2005/8/layout/lProcess2"/>
     <dgm:cxn modelId="{A9B11A4C-4E68-4BCE-BA1C-20A31F515B69}" srcId="{BB0E69BC-A4D3-40BA-B837-7DDB8D6439D6}" destId="{DD5E483C-FCF6-4A0D-91A9-2A88F51EABD9}" srcOrd="0" destOrd="0" parTransId="{48179448-6363-4A82-8664-C7A80FA701D6}" sibTransId="{7556F97C-7BDD-48E7-B4F3-556275969685}"/>
     <dgm:cxn modelId="{FB62C863-80AD-408D-AB70-1758E1B5507C}" type="presOf" srcId="{DD5E483C-FCF6-4A0D-91A9-2A88F51EABD9}" destId="{655BD28E-914B-40F6-831E-3FDE0CAF804D}" srcOrd="1" destOrd="0" presId="urn:microsoft.com/office/officeart/2005/8/layout/lProcess2"/>
+    <dgm:cxn modelId="{82FC077C-83E9-4BA8-B7A2-FCFB1FEBFBE4}" type="presOf" srcId="{DD5E483C-FCF6-4A0D-91A9-2A88F51EABD9}" destId="{460E9640-3640-4176-8F97-561AE3B60665}" srcOrd="0" destOrd="0" presId="urn:microsoft.com/office/officeart/2005/8/layout/lProcess2"/>
     <dgm:cxn modelId="{A01F74F0-A20A-418D-99CA-BEC299A1DAD8}" srcId="{DD5E483C-FCF6-4A0D-91A9-2A88F51EABD9}" destId="{8F858D99-DEA6-4B7B-90ED-9879BD7D73D9}" srcOrd="1" destOrd="0" parTransId="{E17A5A93-BF9C-40BB-B878-B1BE28C352A7}" sibTransId="{00BAAE76-E71A-4716-A33F-6EB9CC03E165}"/>
-    <dgm:cxn modelId="{82FC077C-83E9-4BA8-B7A2-FCFB1FEBFBE4}" type="presOf" srcId="{DD5E483C-FCF6-4A0D-91A9-2A88F51EABD9}" destId="{460E9640-3640-4176-8F97-561AE3B60665}" srcOrd="0" destOrd="0" presId="urn:microsoft.com/office/officeart/2005/8/layout/lProcess2"/>
     <dgm:cxn modelId="{317F3259-6F5C-4E30-982E-1D96C629577B}" type="presOf" srcId="{8F858D99-DEA6-4B7B-90ED-9879BD7D73D9}" destId="{184508E5-6CAE-439C-A541-1FEE9D79530C}" srcOrd="0" destOrd="0" presId="urn:microsoft.com/office/officeart/2005/8/layout/lProcess2"/>
     <dgm:cxn modelId="{B2037B6A-3729-4F71-A5E2-488542CE709C}" srcId="{DD5E483C-FCF6-4A0D-91A9-2A88F51EABD9}" destId="{7FED3E73-FFA5-478F-AEB7-ABD1AFD42DC1}" srcOrd="2" destOrd="0" parTransId="{F071B464-23E0-4D3B-8AED-CA7649BE155A}" sibTransId="{701CB8F3-8DEB-4DED-B82A-CBA511E4B98A}"/>
     <dgm:cxn modelId="{26929BB6-975E-48AD-BAAB-17D6EC78E852}" type="presOf" srcId="{7FED3E73-FFA5-478F-AEB7-ABD1AFD42DC1}" destId="{CBB49329-DED4-4C56-B85F-0E97B3AA295B}" srcOrd="0" destOrd="0" presId="urn:microsoft.com/office/officeart/2005/8/layout/lProcess2"/>
@@ -31725,7 +31728,7 @@
             <a:fld id="{2F7109DB-22F2-4A44-B01C-5DFB47C7C527}" type="datetimeFigureOut">
               <a:rPr lang="fr-FR" smtClean="0"/>
               <a:pPr/>
-              <a:t>23/01/2012</a:t>
+              <a:t>28/02/2012</a:t>
             </a:fld>
             <a:endParaRPr lang="fr-FR"/>
           </a:p>
@@ -31892,7 +31895,7 @@
             <a:fld id="{2F7109DB-22F2-4A44-B01C-5DFB47C7C527}" type="datetimeFigureOut">
               <a:rPr lang="fr-FR" smtClean="0"/>
               <a:pPr/>
-              <a:t>23/01/2012</a:t>
+              <a:t>28/02/2012</a:t>
             </a:fld>
             <a:endParaRPr lang="fr-FR"/>
           </a:p>
@@ -32069,7 +32072,7 @@
             <a:fld id="{2F7109DB-22F2-4A44-B01C-5DFB47C7C527}" type="datetimeFigureOut">
               <a:rPr lang="fr-FR" smtClean="0"/>
               <a:pPr/>
-              <a:t>23/01/2012</a:t>
+              <a:t>28/02/2012</a:t>
             </a:fld>
             <a:endParaRPr lang="fr-FR"/>
           </a:p>
@@ -32236,7 +32239,7 @@
             <a:fld id="{2F7109DB-22F2-4A44-B01C-5DFB47C7C527}" type="datetimeFigureOut">
               <a:rPr lang="fr-FR" smtClean="0"/>
               <a:pPr/>
-              <a:t>23/01/2012</a:t>
+              <a:t>28/02/2012</a:t>
             </a:fld>
             <a:endParaRPr lang="fr-FR"/>
           </a:p>
@@ -32479,7 +32482,7 @@
             <a:fld id="{2F7109DB-22F2-4A44-B01C-5DFB47C7C527}" type="datetimeFigureOut">
               <a:rPr lang="fr-FR" smtClean="0"/>
               <a:pPr/>
-              <a:t>23/01/2012</a:t>
+              <a:t>28/02/2012</a:t>
             </a:fld>
             <a:endParaRPr lang="fr-FR"/>
           </a:p>
@@ -32764,7 +32767,7 @@
             <a:fld id="{2F7109DB-22F2-4A44-B01C-5DFB47C7C527}" type="datetimeFigureOut">
               <a:rPr lang="fr-FR" smtClean="0"/>
               <a:pPr/>
-              <a:t>23/01/2012</a:t>
+              <a:t>28/02/2012</a:t>
             </a:fld>
             <a:endParaRPr lang="fr-FR"/>
           </a:p>
@@ -33183,7 +33186,7 @@
             <a:fld id="{2F7109DB-22F2-4A44-B01C-5DFB47C7C527}" type="datetimeFigureOut">
               <a:rPr lang="fr-FR" smtClean="0"/>
               <a:pPr/>
-              <a:t>23/01/2012</a:t>
+              <a:t>28/02/2012</a:t>
             </a:fld>
             <a:endParaRPr lang="fr-FR"/>
           </a:p>
@@ -33298,7 +33301,7 @@
             <a:fld id="{2F7109DB-22F2-4A44-B01C-5DFB47C7C527}" type="datetimeFigureOut">
               <a:rPr lang="fr-FR" smtClean="0"/>
               <a:pPr/>
-              <a:t>23/01/2012</a:t>
+              <a:t>28/02/2012</a:t>
             </a:fld>
             <a:endParaRPr lang="fr-FR"/>
           </a:p>
@@ -33390,7 +33393,7 @@
             <a:fld id="{2F7109DB-22F2-4A44-B01C-5DFB47C7C527}" type="datetimeFigureOut">
               <a:rPr lang="fr-FR" smtClean="0"/>
               <a:pPr/>
-              <a:t>23/01/2012</a:t>
+              <a:t>28/02/2012</a:t>
             </a:fld>
             <a:endParaRPr lang="fr-FR"/>
           </a:p>
@@ -33664,7 +33667,7 @@
             <a:fld id="{2F7109DB-22F2-4A44-B01C-5DFB47C7C527}" type="datetimeFigureOut">
               <a:rPr lang="fr-FR" smtClean="0"/>
               <a:pPr/>
-              <a:t>23/01/2012</a:t>
+              <a:t>28/02/2012</a:t>
             </a:fld>
             <a:endParaRPr lang="fr-FR"/>
           </a:p>
@@ -33914,7 +33917,7 @@
             <a:fld id="{2F7109DB-22F2-4A44-B01C-5DFB47C7C527}" type="datetimeFigureOut">
               <a:rPr lang="fr-FR" smtClean="0"/>
               <a:pPr/>
-              <a:t>23/01/2012</a:t>
+              <a:t>28/02/2012</a:t>
             </a:fld>
             <a:endParaRPr lang="fr-FR"/>
           </a:p>
@@ -34124,7 +34127,7 @@
             <a:fld id="{2F7109DB-22F2-4A44-B01C-5DFB47C7C527}" type="datetimeFigureOut">
               <a:rPr lang="fr-FR" smtClean="0"/>
               <a:pPr/>
-              <a:t>23/01/2012</a:t>
+              <a:t>28/02/2012</a:t>
             </a:fld>
             <a:endParaRPr lang="fr-FR"/>
           </a:p>
@@ -39112,6 +39115,574 @@
 </p:sld>
 </file>
 
+<file path=ppt/slides/slide27.xml><?xml version="1.0" encoding="utf-8"?>
+<p:sld xmlns:a="http://schemas.openxmlformats.org/drawingml/2006/main" xmlns:r="http://schemas.openxmlformats.org/officeDocument/2006/relationships" xmlns:p="http://schemas.openxmlformats.org/presentationml/2006/main">
+  <p:cSld>
+    <p:spTree>
+      <p:nvGrpSpPr>
+        <p:cNvPr id="1" name=""/>
+        <p:cNvGrpSpPr/>
+        <p:nvPr/>
+      </p:nvGrpSpPr>
+      <p:grpSpPr>
+        <a:xfrm>
+          <a:off x="0" y="0"/>
+          <a:ext cx="0" cy="0"/>
+          <a:chOff x="0" y="0"/>
+          <a:chExt cx="0" cy="0"/>
+        </a:xfrm>
+      </p:grpSpPr>
+      <p:sp>
+        <p:nvSpPr>
+          <p:cNvPr id="4" name="Titre 3"/>
+          <p:cNvSpPr>
+            <a:spLocks noGrp="1"/>
+          </p:cNvSpPr>
+          <p:nvPr>
+            <p:ph type="title"/>
+          </p:nvPr>
+        </p:nvSpPr>
+        <p:spPr/>
+        <p:txBody>
+          <a:bodyPr/>
+          <a:lstStyle/>
+          <a:p>
+            <a:endParaRPr lang="en-US" dirty="0"/>
+          </a:p>
+        </p:txBody>
+      </p:sp>
+      <p:sp>
+        <p:nvSpPr>
+          <p:cNvPr id="6" name="Rectangle à coins arrondis 5"/>
+          <p:cNvSpPr/>
+          <p:nvPr/>
+        </p:nvSpPr>
+        <p:spPr>
+          <a:xfrm>
+            <a:off x="2987824" y="4797152"/>
+            <a:ext cx="2376264" cy="1728192"/>
+          </a:xfrm>
+          <a:prstGeom prst="roundRect">
+            <a:avLst/>
+          </a:prstGeom>
+        </p:spPr>
+        <p:style>
+          <a:lnRef idx="2">
+            <a:schemeClr val="accent1">
+              <a:shade val="50000"/>
+            </a:schemeClr>
+          </a:lnRef>
+          <a:fillRef idx="1">
+            <a:schemeClr val="accent1"/>
+          </a:fillRef>
+          <a:effectRef idx="0">
+            <a:schemeClr val="accent1"/>
+          </a:effectRef>
+          <a:fontRef idx="minor">
+            <a:schemeClr val="lt1"/>
+          </a:fontRef>
+        </p:style>
+        <p:txBody>
+          <a:bodyPr rtlCol="0" anchor="ctr"/>
+          <a:lstStyle/>
+          <a:p>
+            <a:pPr algn="ctr"/>
+            <a:r>
+              <a:rPr lang="fr-FR" dirty="0" err="1" smtClean="0"/>
+              <a:t>OMOptimBasis</a:t>
+            </a:r>
+            <a:endParaRPr lang="fr-FR" dirty="0" smtClean="0"/>
+          </a:p>
+          <a:p>
+            <a:pPr algn="ctr"/>
+            <a:r>
+              <a:rPr lang="fr-FR" sz="1400" dirty="0" smtClean="0"/>
+              <a:t>Variables, </a:t>
+            </a:r>
+            <a:r>
+              <a:rPr lang="fr-FR" sz="1400" dirty="0" err="1" smtClean="0"/>
+              <a:t>Problems</a:t>
+            </a:r>
+            <a:r>
+              <a:rPr lang="fr-FR" sz="1400" dirty="0" smtClean="0"/>
+              <a:t>, Settings, GUI</a:t>
+            </a:r>
+            <a:endParaRPr lang="en-US" sz="1400" dirty="0"/>
+          </a:p>
+        </p:txBody>
+      </p:sp>
+      <p:sp>
+        <p:nvSpPr>
+          <p:cNvPr id="7" name="Rectangle à coins arrondis 6"/>
+          <p:cNvSpPr/>
+          <p:nvPr/>
+        </p:nvSpPr>
+        <p:spPr>
+          <a:xfrm>
+            <a:off x="1043608" y="1628800"/>
+            <a:ext cx="1872208" cy="1944216"/>
+          </a:xfrm>
+          <a:prstGeom prst="roundRect">
+            <a:avLst/>
+          </a:prstGeom>
+        </p:spPr>
+        <p:style>
+          <a:lnRef idx="2">
+            <a:schemeClr val="accent1">
+              <a:shade val="50000"/>
+            </a:schemeClr>
+          </a:lnRef>
+          <a:fillRef idx="1">
+            <a:schemeClr val="accent1"/>
+          </a:fillRef>
+          <a:effectRef idx="0">
+            <a:schemeClr val="accent1"/>
+          </a:effectRef>
+          <a:fontRef idx="minor">
+            <a:schemeClr val="lt1"/>
+          </a:fontRef>
+        </p:style>
+        <p:txBody>
+          <a:bodyPr rtlCol="0" anchor="ctr"/>
+          <a:lstStyle/>
+          <a:p>
+            <a:pPr algn="ctr"/>
+            <a:r>
+              <a:rPr lang="fr-FR" dirty="0" err="1" smtClean="0"/>
+              <a:t>OMOptim</a:t>
+            </a:r>
+            <a:endParaRPr lang="en-US" dirty="0"/>
+          </a:p>
+        </p:txBody>
+      </p:sp>
+      <p:sp>
+        <p:nvSpPr>
+          <p:cNvPr id="8" name="Rectangle à coins arrondis 7"/>
+          <p:cNvSpPr/>
+          <p:nvPr/>
+        </p:nvSpPr>
+        <p:spPr>
+          <a:xfrm>
+            <a:off x="5364088" y="1556792"/>
+            <a:ext cx="2592288" cy="1944216"/>
+          </a:xfrm>
+          <a:prstGeom prst="roundRect">
+            <a:avLst/>
+          </a:prstGeom>
+        </p:spPr>
+        <p:style>
+          <a:lnRef idx="2">
+            <a:schemeClr val="accent1">
+              <a:shade val="50000"/>
+            </a:schemeClr>
+          </a:lnRef>
+          <a:fillRef idx="1">
+            <a:schemeClr val="accent1"/>
+          </a:fillRef>
+          <a:effectRef idx="0">
+            <a:schemeClr val="accent1"/>
+          </a:effectRef>
+          <a:fontRef idx="minor">
+            <a:schemeClr val="lt1"/>
+          </a:fontRef>
+        </p:style>
+        <p:txBody>
+          <a:bodyPr rtlCol="0" anchor="ctr"/>
+          <a:lstStyle/>
+          <a:p>
+            <a:pPr algn="ctr"/>
+            <a:r>
+              <a:rPr lang="fr-FR" dirty="0" err="1" smtClean="0"/>
+              <a:t>PluginEI</a:t>
+            </a:r>
+            <a:endParaRPr lang="en-US" dirty="0"/>
+          </a:p>
+        </p:txBody>
+      </p:sp>
+      <p:sp>
+        <p:nvSpPr>
+          <p:cNvPr id="9" name="Rectangle à coins arrondis 8"/>
+          <p:cNvSpPr/>
+          <p:nvPr/>
+        </p:nvSpPr>
+        <p:spPr>
+          <a:xfrm>
+            <a:off x="5580112" y="2780928"/>
+            <a:ext cx="1080120" cy="648072"/>
+          </a:xfrm>
+          <a:prstGeom prst="roundRect">
+            <a:avLst/>
+          </a:prstGeom>
+        </p:spPr>
+        <p:style>
+          <a:lnRef idx="2">
+            <a:schemeClr val="accent6">
+              <a:shade val="50000"/>
+            </a:schemeClr>
+          </a:lnRef>
+          <a:fillRef idx="1">
+            <a:schemeClr val="accent6"/>
+          </a:fillRef>
+          <a:effectRef idx="0">
+            <a:schemeClr val="accent6"/>
+          </a:effectRef>
+          <a:fontRef idx="minor">
+            <a:schemeClr val="lt1"/>
+          </a:fontRef>
+        </p:style>
+        <p:txBody>
+          <a:bodyPr rtlCol="0" anchor="ctr"/>
+          <a:lstStyle/>
+          <a:p>
+            <a:pPr algn="ctr"/>
+            <a:r>
+              <a:rPr lang="fr-FR" sz="1400" dirty="0" err="1" smtClean="0"/>
+              <a:t>PluginEI</a:t>
+            </a:r>
+            <a:endParaRPr lang="fr-FR" sz="1400" dirty="0" smtClean="0"/>
+          </a:p>
+          <a:p>
+            <a:pPr algn="ctr"/>
+            <a:r>
+              <a:rPr lang="fr-FR" sz="1400" dirty="0" err="1" smtClean="0"/>
+              <a:t>OMOptim</a:t>
+            </a:r>
+            <a:endParaRPr lang="en-US" sz="1400" dirty="0"/>
+          </a:p>
+        </p:txBody>
+      </p:sp>
+      <p:sp>
+        <p:nvSpPr>
+          <p:cNvPr id="10" name="Rectangle à coins arrondis 9"/>
+          <p:cNvSpPr/>
+          <p:nvPr/>
+        </p:nvSpPr>
+        <p:spPr>
+          <a:xfrm>
+            <a:off x="1763688" y="2924944"/>
+            <a:ext cx="1080120" cy="432048"/>
+          </a:xfrm>
+          <a:prstGeom prst="roundRect">
+            <a:avLst/>
+          </a:prstGeom>
+        </p:spPr>
+        <p:style>
+          <a:lnRef idx="2">
+            <a:schemeClr val="accent6">
+              <a:shade val="50000"/>
+            </a:schemeClr>
+          </a:lnRef>
+          <a:fillRef idx="1">
+            <a:schemeClr val="accent6"/>
+          </a:fillRef>
+          <a:effectRef idx="0">
+            <a:schemeClr val="accent6"/>
+          </a:effectRef>
+          <a:fontRef idx="minor">
+            <a:schemeClr val="lt1"/>
+          </a:fontRef>
+        </p:style>
+        <p:txBody>
+          <a:bodyPr rtlCol="0" anchor="ctr"/>
+          <a:lstStyle/>
+          <a:p>
+            <a:pPr algn="ctr"/>
+            <a:r>
+              <a:rPr lang="fr-FR" sz="1400" dirty="0" err="1" smtClean="0"/>
+              <a:t>Modelica</a:t>
+            </a:r>
+            <a:endParaRPr lang="en-US" sz="1400" dirty="0"/>
+          </a:p>
+        </p:txBody>
+      </p:sp>
+      <p:cxnSp>
+        <p:nvCxnSpPr>
+          <p:cNvPr id="12" name="Connecteur droit avec flèche 11"/>
+          <p:cNvCxnSpPr>
+            <a:stCxn id="7" idx="2"/>
+            <a:endCxn id="6" idx="0"/>
+          </p:cNvCxnSpPr>
+          <p:nvPr/>
+        </p:nvCxnSpPr>
+        <p:spPr>
+          <a:xfrm>
+            <a:off x="1979712" y="3573016"/>
+            <a:ext cx="2196244" cy="1224136"/>
+          </a:xfrm>
+          <a:prstGeom prst="straightConnector1">
+            <a:avLst/>
+          </a:prstGeom>
+          <a:ln>
+            <a:tailEnd type="arrow"/>
+          </a:ln>
+        </p:spPr>
+        <p:style>
+          <a:lnRef idx="1">
+            <a:schemeClr val="accent1"/>
+          </a:lnRef>
+          <a:fillRef idx="0">
+            <a:schemeClr val="accent1"/>
+          </a:fillRef>
+          <a:effectRef idx="0">
+            <a:schemeClr val="accent1"/>
+          </a:effectRef>
+          <a:fontRef idx="minor">
+            <a:schemeClr val="tx1"/>
+          </a:fontRef>
+        </p:style>
+      </p:cxnSp>
+      <p:cxnSp>
+        <p:nvCxnSpPr>
+          <p:cNvPr id="14" name="Connecteur droit avec flèche 13"/>
+          <p:cNvCxnSpPr>
+            <a:stCxn id="8" idx="2"/>
+            <a:endCxn id="6" idx="0"/>
+          </p:cNvCxnSpPr>
+          <p:nvPr/>
+        </p:nvCxnSpPr>
+        <p:spPr>
+          <a:xfrm flipH="1">
+            <a:off x="4175956" y="3501008"/>
+            <a:ext cx="2484276" cy="1296144"/>
+          </a:xfrm>
+          <a:prstGeom prst="straightConnector1">
+            <a:avLst/>
+          </a:prstGeom>
+          <a:ln>
+            <a:tailEnd type="arrow"/>
+          </a:ln>
+        </p:spPr>
+        <p:style>
+          <a:lnRef idx="1">
+            <a:schemeClr val="accent1"/>
+          </a:lnRef>
+          <a:fillRef idx="0">
+            <a:schemeClr val="accent1"/>
+          </a:fillRef>
+          <a:effectRef idx="0">
+            <a:schemeClr val="accent1"/>
+          </a:effectRef>
+          <a:fontRef idx="minor">
+            <a:schemeClr val="tx1"/>
+          </a:fontRef>
+        </p:style>
+      </p:cxnSp>
+      <p:cxnSp>
+        <p:nvCxnSpPr>
+          <p:cNvPr id="17" name="Connecteur droit avec flèche 16"/>
+          <p:cNvCxnSpPr>
+            <a:endCxn id="8" idx="1"/>
+          </p:cNvCxnSpPr>
+          <p:nvPr/>
+        </p:nvCxnSpPr>
+        <p:spPr>
+          <a:xfrm flipV="1">
+            <a:off x="2904067" y="2528900"/>
+            <a:ext cx="2460021" cy="11100"/>
+          </a:xfrm>
+          <a:prstGeom prst="straightConnector1">
+            <a:avLst/>
+          </a:prstGeom>
+          <a:ln>
+            <a:tailEnd type="arrow"/>
+          </a:ln>
+        </p:spPr>
+        <p:style>
+          <a:lnRef idx="3">
+            <a:schemeClr val="accent1"/>
+          </a:lnRef>
+          <a:fillRef idx="0">
+            <a:schemeClr val="accent1"/>
+          </a:fillRef>
+          <a:effectRef idx="2">
+            <a:schemeClr val="accent1"/>
+          </a:effectRef>
+          <a:fontRef idx="minor">
+            <a:schemeClr val="tx1"/>
+          </a:fontRef>
+        </p:style>
+      </p:cxnSp>
+      <p:cxnSp>
+        <p:nvCxnSpPr>
+          <p:cNvPr id="19" name="Connecteur droit avec flèche 18"/>
+          <p:cNvCxnSpPr>
+            <a:stCxn id="9" idx="1"/>
+          </p:cNvCxnSpPr>
+          <p:nvPr/>
+        </p:nvCxnSpPr>
+        <p:spPr>
+          <a:xfrm flipH="1" flipV="1">
+            <a:off x="2937933" y="3098800"/>
+            <a:ext cx="2642179" cy="6164"/>
+          </a:xfrm>
+          <a:prstGeom prst="straightConnector1">
+            <a:avLst/>
+          </a:prstGeom>
+          <a:ln>
+            <a:tailEnd type="arrow"/>
+          </a:ln>
+        </p:spPr>
+        <p:style>
+          <a:lnRef idx="3">
+            <a:schemeClr val="accent6"/>
+          </a:lnRef>
+          <a:fillRef idx="0">
+            <a:schemeClr val="accent6"/>
+          </a:fillRef>
+          <a:effectRef idx="2">
+            <a:schemeClr val="accent6"/>
+          </a:effectRef>
+          <a:fontRef idx="minor">
+            <a:schemeClr val="tx1"/>
+          </a:fontRef>
+        </p:style>
+      </p:cxnSp>
+    </p:spTree>
+  </p:cSld>
+  <p:clrMapOvr>
+    <a:masterClrMapping/>
+  </p:clrMapOvr>
+</p:sld>
+</file>
+
+<file path=ppt/slides/slide28.xml><?xml version="1.0" encoding="utf-8"?>
+<p:sld xmlns:a="http://schemas.openxmlformats.org/drawingml/2006/main" xmlns:r="http://schemas.openxmlformats.org/officeDocument/2006/relationships" xmlns:p="http://schemas.openxmlformats.org/presentationml/2006/main">
+  <p:cSld>
+    <p:spTree>
+      <p:nvGrpSpPr>
+        <p:cNvPr id="1" name=""/>
+        <p:cNvGrpSpPr/>
+        <p:nvPr/>
+      </p:nvGrpSpPr>
+      <p:grpSpPr>
+        <a:xfrm>
+          <a:off x="0" y="0"/>
+          <a:ext cx="0" cy="0"/>
+          <a:chOff x="0" y="0"/>
+          <a:chExt cx="0" cy="0"/>
+        </a:xfrm>
+      </p:grpSpPr>
+      <p:sp>
+        <p:nvSpPr>
+          <p:cNvPr id="2" name="Titre 1"/>
+          <p:cNvSpPr>
+            <a:spLocks noGrp="1"/>
+          </p:cNvSpPr>
+          <p:nvPr>
+            <p:ph type="title"/>
+          </p:nvPr>
+        </p:nvSpPr>
+        <p:spPr/>
+        <p:txBody>
+          <a:bodyPr/>
+          <a:lstStyle/>
+          <a:p>
+            <a:r>
+              <a:rPr lang="fr-FR" dirty="0" smtClean="0"/>
+              <a:t>Source code </a:t>
+            </a:r>
+            <a:r>
+              <a:rPr lang="fr-FR" dirty="0" err="1" smtClean="0"/>
+              <a:t>storage</a:t>
+            </a:r>
+            <a:endParaRPr lang="en-US" dirty="0"/>
+          </a:p>
+        </p:txBody>
+      </p:sp>
+      <p:sp>
+        <p:nvSpPr>
+          <p:cNvPr id="3" name="Espace réservé du contenu 2"/>
+          <p:cNvSpPr>
+            <a:spLocks noGrp="1"/>
+          </p:cNvSpPr>
+          <p:nvPr>
+            <p:ph idx="1"/>
+          </p:nvPr>
+        </p:nvSpPr>
+        <p:spPr/>
+        <p:txBody>
+          <a:bodyPr/>
+          <a:lstStyle/>
+          <a:p>
+            <a:endParaRPr lang="en-US"/>
+          </a:p>
+        </p:txBody>
+      </p:sp>
+    </p:spTree>
+  </p:cSld>
+  <p:clrMapOvr>
+    <a:masterClrMapping/>
+  </p:clrMapOvr>
+</p:sld>
+</file>
+
+<file path=ppt/slides/slide29.xml><?xml version="1.0" encoding="utf-8"?>
+<p:sld xmlns:a="http://schemas.openxmlformats.org/drawingml/2006/main" xmlns:r="http://schemas.openxmlformats.org/officeDocument/2006/relationships" xmlns:p="http://schemas.openxmlformats.org/presentationml/2006/main">
+  <p:cSld>
+    <p:spTree>
+      <p:nvGrpSpPr>
+        <p:cNvPr id="1" name=""/>
+        <p:cNvGrpSpPr/>
+        <p:nvPr/>
+      </p:nvGrpSpPr>
+      <p:grpSpPr>
+        <a:xfrm>
+          <a:off x="0" y="0"/>
+          <a:ext cx="0" cy="0"/>
+          <a:chOff x="0" y="0"/>
+          <a:chExt cx="0" cy="0"/>
+        </a:xfrm>
+      </p:grpSpPr>
+      <p:sp>
+        <p:nvSpPr>
+          <p:cNvPr id="2" name="Titre 1"/>
+          <p:cNvSpPr>
+            <a:spLocks noGrp="1"/>
+          </p:cNvSpPr>
+          <p:nvPr>
+            <p:ph type="title"/>
+          </p:nvPr>
+        </p:nvSpPr>
+        <p:spPr/>
+        <p:txBody>
+          <a:bodyPr/>
+          <a:lstStyle/>
+          <a:p>
+            <a:r>
+              <a:rPr lang="fr-FR" smtClean="0"/>
+              <a:t>Documentation</a:t>
+            </a:r>
+            <a:endParaRPr lang="en-US"/>
+          </a:p>
+        </p:txBody>
+      </p:sp>
+      <p:sp>
+        <p:nvSpPr>
+          <p:cNvPr id="3" name="Espace réservé du contenu 2"/>
+          <p:cNvSpPr>
+            <a:spLocks noGrp="1"/>
+          </p:cNvSpPr>
+          <p:nvPr>
+            <p:ph idx="1"/>
+          </p:nvPr>
+        </p:nvSpPr>
+        <p:spPr/>
+        <p:txBody>
+          <a:bodyPr/>
+          <a:lstStyle/>
+          <a:p>
+            <a:endParaRPr lang="en-US"/>
+          </a:p>
+        </p:txBody>
+      </p:sp>
+    </p:spTree>
+  </p:cSld>
+  <p:clrMapOvr>
+    <a:masterClrMapping/>
+  </p:clrMapOvr>
+</p:sld>
+</file>
+
 <file path=ppt/slides/slide3.xml><?xml version="1.0" encoding="utf-8"?>
 <p:sld xmlns:a="http://schemas.openxmlformats.org/drawingml/2006/main" xmlns:r="http://schemas.openxmlformats.org/officeDocument/2006/relationships" xmlns:p="http://schemas.openxmlformats.org/presentationml/2006/main">
   <p:cSld>

</xml_diff>